<commit_message>
update core spring slide for exlaining xxx.
</commit_message>
<xml_diff>
--- a/pivotal-core-spring.pptx
+++ b/pivotal-core-spring.pptx
@@ -5,7 +5,7 @@
     <p:sldMasterId id="2147483660" r:id="rId1"/>
   </p:sldMasterIdLst>
   <p:notesMasterIdLst>
-    <p:notesMasterId r:id="rId46"/>
+    <p:notesMasterId r:id="rId47"/>
   </p:notesMasterIdLst>
   <p:sldIdLst>
     <p:sldId id="287" r:id="rId2"/>
@@ -45,13 +45,14 @@
     <p:sldId id="283" r:id="rId36"/>
     <p:sldId id="284" r:id="rId37"/>
     <p:sldId id="262" r:id="rId38"/>
-    <p:sldId id="292" r:id="rId39"/>
-    <p:sldId id="300" r:id="rId40"/>
-    <p:sldId id="256" r:id="rId41"/>
-    <p:sldId id="260" r:id="rId42"/>
-    <p:sldId id="296" r:id="rId43"/>
-    <p:sldId id="259" r:id="rId44"/>
-    <p:sldId id="288" r:id="rId45"/>
+    <p:sldId id="302" r:id="rId39"/>
+    <p:sldId id="292" r:id="rId40"/>
+    <p:sldId id="300" r:id="rId41"/>
+    <p:sldId id="256" r:id="rId42"/>
+    <p:sldId id="260" r:id="rId43"/>
+    <p:sldId id="296" r:id="rId44"/>
+    <p:sldId id="259" r:id="rId45"/>
+    <p:sldId id="288" r:id="rId46"/>
   </p:sldIdLst>
   <p:sldSz cx="9144000" cy="6858000" type="screen4x3"/>
   <p:notesSz cx="6858000" cy="9144000"/>
@@ -1263,7 +1264,7 @@
           <a:p>
             <a:fld id="{30395209-6F5E-4567-AA9B-BD46C3F26A6D}" type="datetimeFigureOut">
               <a:rPr kumimoji="1" lang="ja-JP" altLang="en-US" smtClean="0"/>
-              <a:t>2018/7/28</a:t>
+              <a:t>2018/7/29</a:t>
             </a:fld>
             <a:endParaRPr kumimoji="1" lang="ja-JP" altLang="en-US"/>
           </a:p>
@@ -1465,7 +1466,7 @@
           <a:p>
             <a:fld id="{30395209-6F5E-4567-AA9B-BD46C3F26A6D}" type="datetimeFigureOut">
               <a:rPr kumimoji="1" lang="ja-JP" altLang="en-US" smtClean="0"/>
-              <a:t>2018/7/28</a:t>
+              <a:t>2018/7/29</a:t>
             </a:fld>
             <a:endParaRPr kumimoji="1" lang="ja-JP" altLang="en-US"/>
           </a:p>
@@ -1677,7 +1678,7 @@
           <a:p>
             <a:fld id="{30395209-6F5E-4567-AA9B-BD46C3F26A6D}" type="datetimeFigureOut">
               <a:rPr kumimoji="1" lang="ja-JP" altLang="en-US" smtClean="0"/>
-              <a:t>2018/7/28</a:t>
+              <a:t>2018/7/29</a:t>
             </a:fld>
             <a:endParaRPr kumimoji="1" lang="ja-JP" altLang="en-US"/>
           </a:p>
@@ -1879,7 +1880,7 @@
           <a:p>
             <a:fld id="{30395209-6F5E-4567-AA9B-BD46C3F26A6D}" type="datetimeFigureOut">
               <a:rPr kumimoji="1" lang="ja-JP" altLang="en-US" smtClean="0"/>
-              <a:t>2018/7/28</a:t>
+              <a:t>2018/7/29</a:t>
             </a:fld>
             <a:endParaRPr kumimoji="1" lang="ja-JP" altLang="en-US"/>
           </a:p>
@@ -2123,7 +2124,7 @@
           <a:p>
             <a:fld id="{30395209-6F5E-4567-AA9B-BD46C3F26A6D}" type="datetimeFigureOut">
               <a:rPr kumimoji="1" lang="ja-JP" altLang="en-US" smtClean="0"/>
-              <a:t>2018/7/28</a:t>
+              <a:t>2018/7/29</a:t>
             </a:fld>
             <a:endParaRPr kumimoji="1" lang="ja-JP" altLang="en-US"/>
           </a:p>
@@ -2419,7 +2420,7 @@
           <a:p>
             <a:fld id="{30395209-6F5E-4567-AA9B-BD46C3F26A6D}" type="datetimeFigureOut">
               <a:rPr kumimoji="1" lang="ja-JP" altLang="en-US" smtClean="0"/>
-              <a:t>2018/7/28</a:t>
+              <a:t>2018/7/29</a:t>
             </a:fld>
             <a:endParaRPr kumimoji="1" lang="ja-JP" altLang="en-US"/>
           </a:p>
@@ -2850,7 +2851,7 @@
           <a:p>
             <a:fld id="{30395209-6F5E-4567-AA9B-BD46C3F26A6D}" type="datetimeFigureOut">
               <a:rPr kumimoji="1" lang="ja-JP" altLang="en-US" smtClean="0"/>
-              <a:t>2018/7/28</a:t>
+              <a:t>2018/7/29</a:t>
             </a:fld>
             <a:endParaRPr kumimoji="1" lang="ja-JP" altLang="en-US"/>
           </a:p>
@@ -2968,7 +2969,7 @@
           <a:p>
             <a:fld id="{30395209-6F5E-4567-AA9B-BD46C3F26A6D}" type="datetimeFigureOut">
               <a:rPr kumimoji="1" lang="ja-JP" altLang="en-US" smtClean="0"/>
-              <a:t>2018/7/28</a:t>
+              <a:t>2018/7/29</a:t>
             </a:fld>
             <a:endParaRPr kumimoji="1" lang="ja-JP" altLang="en-US"/>
           </a:p>
@@ -3063,7 +3064,7 @@
           <a:p>
             <a:fld id="{30395209-6F5E-4567-AA9B-BD46C3F26A6D}" type="datetimeFigureOut">
               <a:rPr kumimoji="1" lang="ja-JP" altLang="en-US" smtClean="0"/>
-              <a:t>2018/7/28</a:t>
+              <a:t>2018/7/29</a:t>
             </a:fld>
             <a:endParaRPr kumimoji="1" lang="ja-JP" altLang="en-US"/>
           </a:p>
@@ -3372,7 +3373,7 @@
           <a:p>
             <a:fld id="{30395209-6F5E-4567-AA9B-BD46C3F26A6D}" type="datetimeFigureOut">
               <a:rPr kumimoji="1" lang="ja-JP" altLang="en-US" smtClean="0"/>
-              <a:t>2018/7/28</a:t>
+              <a:t>2018/7/29</a:t>
             </a:fld>
             <a:endParaRPr kumimoji="1" lang="ja-JP" altLang="en-US"/>
           </a:p>
@@ -3629,7 +3630,7 @@
           <a:p>
             <a:fld id="{30395209-6F5E-4567-AA9B-BD46C3F26A6D}" type="datetimeFigureOut">
               <a:rPr kumimoji="1" lang="ja-JP" altLang="en-US" smtClean="0"/>
-              <a:t>2018/7/28</a:t>
+              <a:t>2018/7/29</a:t>
             </a:fld>
             <a:endParaRPr kumimoji="1" lang="ja-JP" altLang="en-US"/>
           </a:p>
@@ -3874,7 +3875,7 @@
           <a:p>
             <a:fld id="{30395209-6F5E-4567-AA9B-BD46C3F26A6D}" type="datetimeFigureOut">
               <a:rPr kumimoji="1" lang="ja-JP" altLang="en-US" smtClean="0"/>
-              <a:t>2018/7/28</a:t>
+              <a:t>2018/7/29</a:t>
             </a:fld>
             <a:endParaRPr kumimoji="1" lang="ja-JP" altLang="en-US"/>
           </a:p>
@@ -35209,10 +35210,283 @@
           <a:chExt cx="0" cy="0"/>
         </a:xfrm>
       </p:grpSpPr>
+      <p:sp>
+        <p:nvSpPr>
+          <p:cNvPr id="4" name="正方形/長方形 3">
+            <a:extLst>
+              <a:ext uri="{FF2B5EF4-FFF2-40B4-BE49-F238E27FC236}">
+                <a16:creationId xmlns:a16="http://schemas.microsoft.com/office/drawing/2014/main" id="{32C6647E-0174-48E7-9743-EC8850846EBD}"/>
+              </a:ext>
+            </a:extLst>
+          </p:cNvPr>
+          <p:cNvSpPr/>
+          <p:nvPr/>
+        </p:nvSpPr>
+        <p:spPr>
+          <a:xfrm>
+            <a:off x="0" y="0"/>
+            <a:ext cx="9144000" cy="783771"/>
+          </a:xfrm>
+          <a:prstGeom prst="rect">
+            <a:avLst/>
+          </a:prstGeom>
+          <a:solidFill>
+            <a:schemeClr val="tx1">
+              <a:lumMod val="85000"/>
+              <a:lumOff val="15000"/>
+            </a:schemeClr>
+          </a:solidFill>
+          <a:ln>
+            <a:noFill/>
+          </a:ln>
+        </p:spPr>
+        <p:style>
+          <a:lnRef idx="2">
+            <a:schemeClr val="accent1">
+              <a:shade val="50000"/>
+            </a:schemeClr>
+          </a:lnRef>
+          <a:fillRef idx="1">
+            <a:schemeClr val="accent1"/>
+          </a:fillRef>
+          <a:effectRef idx="0">
+            <a:schemeClr val="accent1"/>
+          </a:effectRef>
+          <a:fontRef idx="minor">
+            <a:schemeClr val="lt1"/>
+          </a:fontRef>
+        </p:style>
+        <p:txBody>
+          <a:bodyPr rtlCol="0" anchor="ctr"/>
+          <a:lstStyle/>
+          <a:p>
+            <a:pPr algn="ctr"/>
+            <a:endParaRPr kumimoji="1" lang="ja-JP" altLang="en-US"/>
+          </a:p>
+        </p:txBody>
+      </p:sp>
+      <p:sp>
+        <p:nvSpPr>
+          <p:cNvPr id="5" name="テキスト ボックス 4">
+            <a:extLst>
+              <a:ext uri="{FF2B5EF4-FFF2-40B4-BE49-F238E27FC236}">
+                <a16:creationId xmlns:a16="http://schemas.microsoft.com/office/drawing/2014/main" id="{05244AEF-A024-4C1F-A085-BDA432EF9126}"/>
+              </a:ext>
+            </a:extLst>
+          </p:cNvPr>
+          <p:cNvSpPr txBox="1"/>
+          <p:nvPr/>
+        </p:nvSpPr>
+        <p:spPr>
+          <a:xfrm>
+            <a:off x="408924" y="161052"/>
+            <a:ext cx="6718852" cy="461665"/>
+          </a:xfrm>
+          <a:prstGeom prst="rect">
+            <a:avLst/>
+          </a:prstGeom>
+          <a:noFill/>
+        </p:spPr>
+        <p:txBody>
+          <a:bodyPr wrap="square" rtlCol="0">
+            <a:spAutoFit/>
+          </a:bodyPr>
+          <a:lstStyle/>
+          <a:p>
+            <a:r>
+              <a:rPr kumimoji="1" lang="ja-JP" altLang="en-US" sz="2400" b="1" dirty="0">
+                <a:solidFill>
+                  <a:schemeClr val="bg1"/>
+                </a:solidFill>
+                <a:latin typeface="Arial" panose="020B0604020202020204" pitchFamily="34" charset="0"/>
+                <a:cs typeface="Arial" panose="020B0604020202020204" pitchFamily="34" charset="0"/>
+              </a:rPr>
+              <a:t>研修を通じて得たもの</a:t>
+            </a:r>
+          </a:p>
+        </p:txBody>
+      </p:sp>
+      <p:sp>
+        <p:nvSpPr>
+          <p:cNvPr id="7" name="テキスト ボックス 6">
+            <a:extLst>
+              <a:ext uri="{FF2B5EF4-FFF2-40B4-BE49-F238E27FC236}">
+                <a16:creationId xmlns:a16="http://schemas.microsoft.com/office/drawing/2014/main" id="{D5B4DBB9-8190-4662-946D-489083AE3614}"/>
+              </a:ext>
+            </a:extLst>
+          </p:cNvPr>
+          <p:cNvSpPr txBox="1"/>
+          <p:nvPr/>
+        </p:nvSpPr>
+        <p:spPr>
+          <a:xfrm>
+            <a:off x="474436" y="1119533"/>
+            <a:ext cx="8618049" cy="2062103"/>
+          </a:xfrm>
+          <a:prstGeom prst="rect">
+            <a:avLst/>
+          </a:prstGeom>
+          <a:noFill/>
+        </p:spPr>
+        <p:txBody>
+          <a:bodyPr wrap="square" rtlCol="0">
+            <a:spAutoFit/>
+          </a:bodyPr>
+          <a:lstStyle/>
+          <a:p>
+            <a:r>
+              <a:rPr kumimoji="1" lang="en-US" altLang="ja-JP" sz="2000" b="1" dirty="0">
+                <a:latin typeface="Arial" panose="020B0604020202020204" pitchFamily="34" charset="0"/>
+                <a:cs typeface="Arial" panose="020B0604020202020204" pitchFamily="34" charset="0"/>
+              </a:rPr>
+              <a:t>(4) Spring Framework</a:t>
+            </a:r>
+            <a:r>
+              <a:rPr kumimoji="1" lang="ja-JP" altLang="en-US" sz="2000" b="1" dirty="0">
+                <a:latin typeface="Arial" panose="020B0604020202020204" pitchFamily="34" charset="0"/>
+                <a:cs typeface="Arial" panose="020B0604020202020204" pitchFamily="34" charset="0"/>
+              </a:rPr>
+              <a:t>自体が学びの多いフレームワーク</a:t>
+            </a:r>
+            <a:endParaRPr kumimoji="1" lang="en-US" altLang="ja-JP" sz="2000" b="1" dirty="0">
+              <a:latin typeface="Arial" panose="020B0604020202020204" pitchFamily="34" charset="0"/>
+              <a:cs typeface="Arial" panose="020B0604020202020204" pitchFamily="34" charset="0"/>
+            </a:endParaRPr>
+          </a:p>
+          <a:p>
+            <a:pPr marL="285750" indent="-285750">
+              <a:buFont typeface="Arial" panose="020B0604020202020204" pitchFamily="34" charset="0"/>
+              <a:buChar char="•"/>
+            </a:pPr>
+            <a:r>
+              <a:rPr kumimoji="1" lang="en-US" altLang="ja-JP" dirty="0">
+                <a:latin typeface="Arial" panose="020B0604020202020204" pitchFamily="34" charset="0"/>
+                <a:cs typeface="Arial" panose="020B0604020202020204" pitchFamily="34" charset="0"/>
+              </a:rPr>
+              <a:t>Spring Data JPA</a:t>
+            </a:r>
+            <a:r>
+              <a:rPr kumimoji="1" lang="ja-JP" altLang="en-US" dirty="0">
+                <a:latin typeface="Arial" panose="020B0604020202020204" pitchFamily="34" charset="0"/>
+                <a:cs typeface="Arial" panose="020B0604020202020204" pitchFamily="34" charset="0"/>
+              </a:rPr>
+              <a:t>を使うと、</a:t>
+            </a:r>
+            <a:r>
+              <a:rPr kumimoji="1" lang="en-US" altLang="ja-JP" dirty="0">
+                <a:latin typeface="Arial" panose="020B0604020202020204" pitchFamily="34" charset="0"/>
+                <a:cs typeface="Arial" panose="020B0604020202020204" pitchFamily="34" charset="0"/>
+              </a:rPr>
+              <a:t>DB</a:t>
+            </a:r>
+            <a:r>
+              <a:rPr kumimoji="1" lang="ja-JP" altLang="en-US" dirty="0">
+                <a:latin typeface="Arial" panose="020B0604020202020204" pitchFamily="34" charset="0"/>
+                <a:cs typeface="Arial" panose="020B0604020202020204" pitchFamily="34" charset="0"/>
+              </a:rPr>
+              <a:t>テーブルのリレーションが重要になってくるので、</a:t>
+            </a:r>
+            <a:r>
+              <a:rPr kumimoji="1" lang="en-US" altLang="ja-JP" dirty="0">
+                <a:latin typeface="Arial" panose="020B0604020202020204" pitchFamily="34" charset="0"/>
+                <a:cs typeface="Arial" panose="020B0604020202020204" pitchFamily="34" charset="0"/>
+              </a:rPr>
+              <a:t>DB</a:t>
+            </a:r>
+            <a:r>
+              <a:rPr kumimoji="1" lang="ja-JP" altLang="en-US" dirty="0">
+                <a:latin typeface="Arial" panose="020B0604020202020204" pitchFamily="34" charset="0"/>
+                <a:cs typeface="Arial" panose="020B0604020202020204" pitchFamily="34" charset="0"/>
+              </a:rPr>
+              <a:t>の設計が気になりだす。</a:t>
+            </a:r>
+            <a:endParaRPr kumimoji="1" lang="en-US" altLang="ja-JP" dirty="0">
+              <a:latin typeface="Arial" panose="020B0604020202020204" pitchFamily="34" charset="0"/>
+              <a:cs typeface="Arial" panose="020B0604020202020204" pitchFamily="34" charset="0"/>
+            </a:endParaRPr>
+          </a:p>
+          <a:p>
+            <a:pPr marL="285750" indent="-285750">
+              <a:buFont typeface="Arial" panose="020B0604020202020204" pitchFamily="34" charset="0"/>
+              <a:buChar char="•"/>
+            </a:pPr>
+            <a:r>
+              <a:rPr kumimoji="1" lang="ja-JP" altLang="en-US" dirty="0">
+                <a:latin typeface="Arial" panose="020B0604020202020204" pitchFamily="34" charset="0"/>
+                <a:cs typeface="Arial" panose="020B0604020202020204" pitchFamily="34" charset="0"/>
+              </a:rPr>
+              <a:t>インスタンス（</a:t>
+            </a:r>
+            <a:r>
+              <a:rPr kumimoji="1" lang="en-US" altLang="ja-JP" dirty="0">
+                <a:latin typeface="Arial" panose="020B0604020202020204" pitchFamily="34" charset="0"/>
+                <a:cs typeface="Arial" panose="020B0604020202020204" pitchFamily="34" charset="0"/>
+              </a:rPr>
+              <a:t>Bean</a:t>
+            </a:r>
+            <a:r>
+              <a:rPr kumimoji="1" lang="ja-JP" altLang="en-US" dirty="0">
+                <a:latin typeface="Arial" panose="020B0604020202020204" pitchFamily="34" charset="0"/>
+                <a:cs typeface="Arial" panose="020B0604020202020204" pitchFamily="34" charset="0"/>
+              </a:rPr>
+              <a:t>）の生成と破棄（ライフサイクル）について意識するようになった。</a:t>
+            </a:r>
+            <a:endParaRPr kumimoji="1" lang="en-US" altLang="ja-JP" dirty="0">
+              <a:latin typeface="Arial" panose="020B0604020202020204" pitchFamily="34" charset="0"/>
+              <a:cs typeface="Arial" panose="020B0604020202020204" pitchFamily="34" charset="0"/>
+            </a:endParaRPr>
+          </a:p>
+          <a:p>
+            <a:pPr marL="285750" indent="-285750">
+              <a:buFont typeface="Arial" panose="020B0604020202020204" pitchFamily="34" charset="0"/>
+              <a:buChar char="•"/>
+            </a:pPr>
+            <a:r>
+              <a:rPr kumimoji="1" lang="en-US" altLang="ja-JP" dirty="0">
+                <a:latin typeface="Arial" panose="020B0604020202020204" pitchFamily="34" charset="0"/>
+                <a:cs typeface="Arial" panose="020B0604020202020204" pitchFamily="34" charset="0"/>
+              </a:rPr>
+              <a:t>Spring Security</a:t>
+            </a:r>
+            <a:r>
+              <a:rPr kumimoji="1" lang="ja-JP" altLang="en-US" dirty="0">
+                <a:latin typeface="Arial" panose="020B0604020202020204" pitchFamily="34" charset="0"/>
+                <a:cs typeface="Arial" panose="020B0604020202020204" pitchFamily="34" charset="0"/>
+              </a:rPr>
+              <a:t>を使うと、セキュリティについて学びがある（平文のパスワードを</a:t>
+            </a:r>
+            <a:r>
+              <a:rPr kumimoji="1" lang="en-US" altLang="ja-JP" dirty="0">
+                <a:latin typeface="Arial" panose="020B0604020202020204" pitchFamily="34" charset="0"/>
+                <a:cs typeface="Arial" panose="020B0604020202020204" pitchFamily="34" charset="0"/>
+              </a:rPr>
+              <a:t>DB</a:t>
+            </a:r>
+            <a:r>
+              <a:rPr kumimoji="1" lang="ja-JP" altLang="en-US" dirty="0" err="1">
+                <a:latin typeface="Arial" panose="020B0604020202020204" pitchFamily="34" charset="0"/>
+                <a:cs typeface="Arial" panose="020B0604020202020204" pitchFamily="34" charset="0"/>
+              </a:rPr>
+              <a:t>に保</a:t>
+            </a:r>
+            <a:r>
+              <a:rPr kumimoji="1" lang="ja-JP" altLang="en-US" dirty="0">
+                <a:latin typeface="Arial" panose="020B0604020202020204" pitchFamily="34" charset="0"/>
+                <a:cs typeface="Arial" panose="020B0604020202020204" pitchFamily="34" charset="0"/>
+              </a:rPr>
+              <a:t>存するのではなく、ハッシュ化した値を格納するなど）。</a:t>
+            </a:r>
+            <a:endParaRPr kumimoji="1" lang="en-US" altLang="ja-JP" dirty="0">
+              <a:latin typeface="Arial" panose="020B0604020202020204" pitchFamily="34" charset="0"/>
+              <a:cs typeface="Arial" panose="020B0604020202020204" pitchFamily="34" charset="0"/>
+            </a:endParaRPr>
+          </a:p>
+        </p:txBody>
+      </p:sp>
     </p:spTree>
     <p:extLst>
       <p:ext uri="{BB962C8B-B14F-4D97-AF65-F5344CB8AC3E}">
-        <p14:creationId xmlns:p14="http://schemas.microsoft.com/office/powerpoint/2010/main" val="1404848620"/>
+        <p14:creationId xmlns:p14="http://schemas.microsoft.com/office/powerpoint/2010/main" val="4195924555"/>
       </p:ext>
     </p:extLst>
   </p:cSld>
@@ -35239,121 +35513,10 @@
           <a:chExt cx="0" cy="0"/>
         </a:xfrm>
       </p:grpSpPr>
-      <p:sp>
-        <p:nvSpPr>
-          <p:cNvPr id="9" name="テキスト ボックス 8">
-            <a:extLst>
-              <a:ext uri="{FF2B5EF4-FFF2-40B4-BE49-F238E27FC236}">
-                <a16:creationId xmlns:a16="http://schemas.microsoft.com/office/drawing/2014/main" id="{37E66540-4F1F-438E-A1AF-47A4BA4110DF}"/>
-              </a:ext>
-            </a:extLst>
-          </p:cNvPr>
-          <p:cNvSpPr txBox="1"/>
-          <p:nvPr/>
-        </p:nvSpPr>
-        <p:spPr>
-          <a:xfrm>
-            <a:off x="373487" y="885733"/>
-            <a:ext cx="8828618" cy="1200329"/>
-          </a:xfrm>
-          <a:prstGeom prst="rect">
-            <a:avLst/>
-          </a:prstGeom>
-          <a:noFill/>
-        </p:spPr>
-        <p:txBody>
-          <a:bodyPr wrap="square" rtlCol="0">
-            <a:spAutoFit/>
-          </a:bodyPr>
-          <a:lstStyle/>
-          <a:p>
-            <a:pPr marL="342900" indent="-342900">
-              <a:buFont typeface="Arial" panose="020B0604020202020204" pitchFamily="34" charset="0"/>
-              <a:buChar char="•"/>
-            </a:pPr>
-            <a:r>
-              <a:rPr kumimoji="1" lang="ja-JP" altLang="en-US" dirty="0">
-                <a:latin typeface="Arial" panose="020B0604020202020204" pitchFamily="34" charset="0"/>
-                <a:cs typeface="Arial" panose="020B0604020202020204" pitchFamily="34" charset="0"/>
-              </a:rPr>
-              <a:t>世の中の動き、自分の立ち位置、行動の助けになるもの</a:t>
-            </a:r>
-            <a:endParaRPr kumimoji="1" lang="en-US" altLang="ja-JP" dirty="0">
-              <a:latin typeface="Arial" panose="020B0604020202020204" pitchFamily="34" charset="0"/>
-              <a:cs typeface="Arial" panose="020B0604020202020204" pitchFamily="34" charset="0"/>
-            </a:endParaRPr>
-          </a:p>
-          <a:p>
-            <a:pPr marL="342900" indent="-342900">
-              <a:buFont typeface="Arial" panose="020B0604020202020204" pitchFamily="34" charset="0"/>
-              <a:buChar char="•"/>
-            </a:pPr>
-            <a:r>
-              <a:rPr kumimoji="1" lang="ja-JP" altLang="en-US" dirty="0">
-                <a:latin typeface="Arial" panose="020B0604020202020204" pitchFamily="34" charset="0"/>
-                <a:cs typeface="Arial" panose="020B0604020202020204" pitchFamily="34" charset="0"/>
-              </a:rPr>
-              <a:t>既存のシステムのどこが悪いのか、どこを気をつけないといけないのか？</a:t>
-            </a:r>
-            <a:endParaRPr kumimoji="1" lang="en-US" altLang="ja-JP" dirty="0">
-              <a:latin typeface="Arial" panose="020B0604020202020204" pitchFamily="34" charset="0"/>
-              <a:cs typeface="Arial" panose="020B0604020202020204" pitchFamily="34" charset="0"/>
-            </a:endParaRPr>
-          </a:p>
-          <a:p>
-            <a:pPr marL="342900" indent="-342900">
-              <a:buFont typeface="Arial" panose="020B0604020202020204" pitchFamily="34" charset="0"/>
-              <a:buChar char="•"/>
-            </a:pPr>
-            <a:r>
-              <a:rPr kumimoji="1" lang="ja-JP" altLang="en-US" dirty="0">
-                <a:latin typeface="Arial" panose="020B0604020202020204" pitchFamily="34" charset="0"/>
-                <a:cs typeface="Arial" panose="020B0604020202020204" pitchFamily="34" charset="0"/>
-              </a:rPr>
-              <a:t>そのために、</a:t>
-            </a:r>
-            <a:r>
-              <a:rPr kumimoji="1" lang="en-US" altLang="ja-JP" dirty="0">
-                <a:latin typeface="Arial" panose="020B0604020202020204" pitchFamily="34" charset="0"/>
-                <a:cs typeface="Arial" panose="020B0604020202020204" pitchFamily="34" charset="0"/>
-              </a:rPr>
-              <a:t>Spring</a:t>
-            </a:r>
-            <a:r>
-              <a:rPr kumimoji="1" lang="ja-JP" altLang="en-US" dirty="0">
-                <a:latin typeface="Arial" panose="020B0604020202020204" pitchFamily="34" charset="0"/>
-                <a:cs typeface="Arial" panose="020B0604020202020204" pitchFamily="34" charset="0"/>
-              </a:rPr>
-              <a:t>がどのように活用できるか。</a:t>
-            </a:r>
-            <a:endParaRPr kumimoji="1" lang="en-US" altLang="ja-JP" dirty="0">
-              <a:latin typeface="Arial" panose="020B0604020202020204" pitchFamily="34" charset="0"/>
-              <a:cs typeface="Arial" panose="020B0604020202020204" pitchFamily="34" charset="0"/>
-            </a:endParaRPr>
-          </a:p>
-          <a:p>
-            <a:pPr marL="342900" indent="-342900">
-              <a:buFont typeface="Arial" panose="020B0604020202020204" pitchFamily="34" charset="0"/>
-              <a:buChar char="•"/>
-            </a:pPr>
-            <a:r>
-              <a:rPr kumimoji="1" lang="ja-JP" altLang="en-US" dirty="0">
-                <a:latin typeface="Arial" panose="020B0604020202020204" pitchFamily="34" charset="0"/>
-                <a:cs typeface="Arial" panose="020B0604020202020204" pitchFamily="34" charset="0"/>
-              </a:rPr>
-              <a:t>他の言語のフレームワークを探す上での指針を示す。</a:t>
-            </a:r>
-            <a:endParaRPr kumimoji="1" lang="en-US" altLang="ja-JP" dirty="0">
-              <a:latin typeface="Arial" panose="020B0604020202020204" pitchFamily="34" charset="0"/>
-              <a:cs typeface="Arial" panose="020B0604020202020204" pitchFamily="34" charset="0"/>
-            </a:endParaRPr>
-          </a:p>
-        </p:txBody>
-      </p:sp>
     </p:spTree>
     <p:extLst>
       <p:ext uri="{BB962C8B-B14F-4D97-AF65-F5344CB8AC3E}">
-        <p14:creationId xmlns:p14="http://schemas.microsoft.com/office/powerpoint/2010/main" val="1630446635"/>
+        <p14:creationId xmlns:p14="http://schemas.microsoft.com/office/powerpoint/2010/main" val="1404848620"/>
       </p:ext>
     </p:extLst>
   </p:cSld>
@@ -35985,65 +36148,10 @@
       </p:grpSpPr>
       <p:sp>
         <p:nvSpPr>
-          <p:cNvPr id="4" name="正方形/長方形 3">
-            <a:extLst>
-              <a:ext uri="{FF2B5EF4-FFF2-40B4-BE49-F238E27FC236}">
-                <a16:creationId xmlns:a16="http://schemas.microsoft.com/office/drawing/2014/main" id="{32C6647E-0174-48E7-9743-EC8850846EBD}"/>
-              </a:ext>
-            </a:extLst>
-          </p:cNvPr>
-          <p:cNvSpPr/>
-          <p:nvPr/>
-        </p:nvSpPr>
-        <p:spPr>
-          <a:xfrm>
-            <a:off x="0" y="0"/>
-            <a:ext cx="9144000" cy="783771"/>
-          </a:xfrm>
-          <a:prstGeom prst="rect">
-            <a:avLst/>
-          </a:prstGeom>
-          <a:solidFill>
-            <a:schemeClr val="tx1">
-              <a:lumMod val="85000"/>
-              <a:lumOff val="15000"/>
-            </a:schemeClr>
-          </a:solidFill>
-          <a:ln>
-            <a:noFill/>
-          </a:ln>
-        </p:spPr>
-        <p:style>
-          <a:lnRef idx="2">
-            <a:schemeClr val="accent1">
-              <a:shade val="50000"/>
-            </a:schemeClr>
-          </a:lnRef>
-          <a:fillRef idx="1">
-            <a:schemeClr val="accent1"/>
-          </a:fillRef>
-          <a:effectRef idx="0">
-            <a:schemeClr val="accent1"/>
-          </a:effectRef>
-          <a:fontRef idx="minor">
-            <a:schemeClr val="lt1"/>
-          </a:fontRef>
-        </p:style>
-        <p:txBody>
-          <a:bodyPr rtlCol="0" anchor="ctr"/>
-          <a:lstStyle/>
-          <a:p>
-            <a:pPr algn="ctr"/>
-            <a:endParaRPr kumimoji="1" lang="ja-JP" altLang="en-US"/>
-          </a:p>
-        </p:txBody>
-      </p:sp>
-      <p:sp>
-        <p:nvSpPr>
-          <p:cNvPr id="5" name="テキスト ボックス 4">
-            <a:extLst>
-              <a:ext uri="{FF2B5EF4-FFF2-40B4-BE49-F238E27FC236}">
-                <a16:creationId xmlns:a16="http://schemas.microsoft.com/office/drawing/2014/main" id="{05244AEF-A024-4C1F-A085-BDA432EF9126}"/>
+          <p:cNvPr id="9" name="テキスト ボックス 8">
+            <a:extLst>
+              <a:ext uri="{FF2B5EF4-FFF2-40B4-BE49-F238E27FC236}">
+                <a16:creationId xmlns:a16="http://schemas.microsoft.com/office/drawing/2014/main" id="{37E66540-4F1F-438E-A1AF-47A4BA4110DF}"/>
               </a:ext>
             </a:extLst>
           </p:cNvPr>
@@ -36052,8 +36160,8 @@
         </p:nvSpPr>
         <p:spPr>
           <a:xfrm>
-            <a:off x="408924" y="161052"/>
-            <a:ext cx="4918450" cy="461665"/>
+            <a:off x="373487" y="885733"/>
+            <a:ext cx="8828618" cy="1200329"/>
           </a:xfrm>
           <a:prstGeom prst="rect">
             <a:avLst/>
@@ -36066,141 +36174,16 @@
           </a:bodyPr>
           <a:lstStyle/>
           <a:p>
-            <a:r>
-              <a:rPr kumimoji="1" lang="ja-JP" altLang="en-US" sz="2400" b="1" dirty="0">
-                <a:solidFill>
-                  <a:schemeClr val="bg1"/>
-                </a:solidFill>
-                <a:latin typeface="Arial" panose="020B0604020202020204" pitchFamily="34" charset="0"/>
-                <a:cs typeface="Arial" panose="020B0604020202020204" pitchFamily="34" charset="0"/>
-              </a:rPr>
-              <a:t>なぜ</a:t>
-            </a:r>
-            <a:r>
-              <a:rPr kumimoji="1" lang="en-US" altLang="ja-JP" sz="2400" b="1" dirty="0">
-                <a:solidFill>
-                  <a:schemeClr val="bg1"/>
-                </a:solidFill>
-                <a:latin typeface="Arial" panose="020B0604020202020204" pitchFamily="34" charset="0"/>
-                <a:cs typeface="Arial" panose="020B0604020202020204" pitchFamily="34" charset="0"/>
-              </a:rPr>
-              <a:t>Spring framework</a:t>
-            </a:r>
-            <a:r>
-              <a:rPr kumimoji="1" lang="ja-JP" altLang="en-US" sz="2400" b="1" dirty="0">
-                <a:solidFill>
-                  <a:schemeClr val="bg1"/>
-                </a:solidFill>
-                <a:latin typeface="Arial" panose="020B0604020202020204" pitchFamily="34" charset="0"/>
-                <a:cs typeface="Arial" panose="020B0604020202020204" pitchFamily="34" charset="0"/>
-              </a:rPr>
-              <a:t>なのか</a:t>
-            </a:r>
-          </a:p>
-        </p:txBody>
-      </p:sp>
-      <p:sp>
-        <p:nvSpPr>
-          <p:cNvPr id="7" name="テキスト ボックス 6">
-            <a:extLst>
-              <a:ext uri="{FF2B5EF4-FFF2-40B4-BE49-F238E27FC236}">
-                <a16:creationId xmlns:a16="http://schemas.microsoft.com/office/drawing/2014/main" id="{D5B4DBB9-8190-4662-946D-489083AE3614}"/>
-              </a:ext>
-            </a:extLst>
-          </p:cNvPr>
-          <p:cNvSpPr txBox="1"/>
-          <p:nvPr/>
-        </p:nvSpPr>
-        <p:spPr>
-          <a:xfrm>
-            <a:off x="519673" y="1224814"/>
-            <a:ext cx="8104653" cy="4616648"/>
-          </a:xfrm>
-          <a:prstGeom prst="rect">
-            <a:avLst/>
-          </a:prstGeom>
-          <a:noFill/>
-        </p:spPr>
-        <p:txBody>
-          <a:bodyPr wrap="square" rtlCol="0">
-            <a:spAutoFit/>
-          </a:bodyPr>
-          <a:lstStyle/>
-          <a:p>
-            <a:r>
-              <a:rPr kumimoji="1" lang="ja-JP" altLang="en-US" sz="2400" b="1" u="sng" dirty="0">
-                <a:latin typeface="Arial" panose="020B0604020202020204" pitchFamily="34" charset="0"/>
-                <a:cs typeface="Arial" panose="020B0604020202020204" pitchFamily="34" charset="0"/>
-              </a:rPr>
-              <a:t>自分なりの答え</a:t>
-            </a:r>
-            <a:endParaRPr kumimoji="1" lang="en-US" altLang="ja-JP" sz="2000" b="1" u="sng" dirty="0">
-              <a:latin typeface="Arial" panose="020B0604020202020204" pitchFamily="34" charset="0"/>
-              <a:cs typeface="Arial" panose="020B0604020202020204" pitchFamily="34" charset="0"/>
-            </a:endParaRPr>
-          </a:p>
-          <a:p>
-            <a:r>
-              <a:rPr kumimoji="1" lang="ja-JP" altLang="en-US" b="1" dirty="0">
-                <a:latin typeface="Arial" panose="020B0604020202020204" pitchFamily="34" charset="0"/>
-                <a:cs typeface="Arial" panose="020B0604020202020204" pitchFamily="34" charset="0"/>
-              </a:rPr>
-              <a:t>（１）</a:t>
-            </a:r>
-            <a:r>
-              <a:rPr kumimoji="1" lang="en-US" altLang="ja-JP" b="1" dirty="0">
-                <a:latin typeface="Arial" panose="020B0604020202020204" pitchFamily="34" charset="0"/>
-                <a:cs typeface="Arial" panose="020B0604020202020204" pitchFamily="34" charset="0"/>
-              </a:rPr>
-              <a:t>Go</a:t>
-            </a:r>
-            <a:r>
-              <a:rPr kumimoji="1" lang="ja-JP" altLang="en-US" b="1" dirty="0">
-                <a:latin typeface="Arial" panose="020B0604020202020204" pitchFamily="34" charset="0"/>
-                <a:cs typeface="Arial" panose="020B0604020202020204" pitchFamily="34" charset="0"/>
-              </a:rPr>
-              <a:t>言語（</a:t>
-            </a:r>
-            <a:r>
-              <a:rPr kumimoji="1" lang="en-US" altLang="ja-JP" b="1" dirty="0">
-                <a:latin typeface="Arial" panose="020B0604020202020204" pitchFamily="34" charset="0"/>
-                <a:cs typeface="Arial" panose="020B0604020202020204" pitchFamily="34" charset="0"/>
-              </a:rPr>
-              <a:t>Golang</a:t>
-            </a:r>
-            <a:r>
-              <a:rPr kumimoji="1" lang="ja-JP" altLang="en-US" b="1" dirty="0">
-                <a:latin typeface="Arial" panose="020B0604020202020204" pitchFamily="34" charset="0"/>
-                <a:cs typeface="Arial" panose="020B0604020202020204" pitchFamily="34" charset="0"/>
-              </a:rPr>
-              <a:t>）</a:t>
-            </a:r>
-            <a:endParaRPr kumimoji="1" lang="en-US" altLang="ja-JP" b="1" dirty="0">
-              <a:latin typeface="Arial" panose="020B0604020202020204" pitchFamily="34" charset="0"/>
-              <a:cs typeface="Arial" panose="020B0604020202020204" pitchFamily="34" charset="0"/>
-            </a:endParaRPr>
-          </a:p>
-          <a:p>
+            <a:pPr marL="342900" indent="-342900">
+              <a:buFont typeface="Arial" panose="020B0604020202020204" pitchFamily="34" charset="0"/>
+              <a:buChar char="•"/>
+            </a:pPr>
             <a:r>
               <a:rPr kumimoji="1" lang="ja-JP" altLang="en-US" dirty="0">
                 <a:latin typeface="Arial" panose="020B0604020202020204" pitchFamily="34" charset="0"/>
                 <a:cs typeface="Arial" panose="020B0604020202020204" pitchFamily="34" charset="0"/>
               </a:rPr>
-              <a:t>　</a:t>
-            </a:r>
-            <a:r>
-              <a:rPr kumimoji="1" lang="ja-JP" altLang="en-US" u="sng" dirty="0">
-                <a:latin typeface="Arial" panose="020B0604020202020204" pitchFamily="34" charset="0"/>
-                <a:cs typeface="Arial" panose="020B0604020202020204" pitchFamily="34" charset="0"/>
-              </a:rPr>
-              <a:t>長所</a:t>
-            </a:r>
-            <a:r>
-              <a:rPr kumimoji="1" lang="ja-JP" altLang="en-US" dirty="0">
-                <a:latin typeface="Arial" panose="020B0604020202020204" pitchFamily="34" charset="0"/>
-                <a:cs typeface="Arial" panose="020B0604020202020204" pitchFamily="34" charset="0"/>
-              </a:rPr>
-              <a:t>　</a:t>
+              <a:t>世の中の動き、自分の立ち位置、行動の助けになるもの</a:t>
             </a:r>
             <a:endParaRPr kumimoji="1" lang="en-US" altLang="ja-JP" dirty="0">
               <a:latin typeface="Arial" panose="020B0604020202020204" pitchFamily="34" charset="0"/>
@@ -36208,26 +36191,16 @@
             </a:endParaRPr>
           </a:p>
           <a:p>
+            <a:pPr marL="342900" indent="-342900">
+              <a:buFont typeface="Arial" panose="020B0604020202020204" pitchFamily="34" charset="0"/>
+              <a:buChar char="•"/>
+            </a:pPr>
             <a:r>
               <a:rPr kumimoji="1" lang="ja-JP" altLang="en-US" dirty="0">
                 <a:latin typeface="Arial" panose="020B0604020202020204" pitchFamily="34" charset="0"/>
                 <a:cs typeface="Arial" panose="020B0604020202020204" pitchFamily="34" charset="0"/>
               </a:rPr>
-              <a:t>　・</a:t>
-            </a:r>
-            <a:r>
-              <a:rPr kumimoji="1" lang="en-US" altLang="ja-JP" dirty="0">
-                <a:latin typeface="Arial" panose="020B0604020202020204" pitchFamily="34" charset="0"/>
-                <a:cs typeface="Arial" panose="020B0604020202020204" pitchFamily="34" charset="0"/>
-              </a:rPr>
-              <a:t>Google</a:t>
-            </a:r>
-            <a:r>
-              <a:rPr kumimoji="1" lang="ja-JP" altLang="en-US" dirty="0">
-                <a:latin typeface="Arial" panose="020B0604020202020204" pitchFamily="34" charset="0"/>
-                <a:cs typeface="Arial" panose="020B0604020202020204" pitchFamily="34" charset="0"/>
-              </a:rPr>
-              <a:t>発のプログラミング言語</a:t>
+              <a:t>既存のシステムのどこが悪いのか、どこを気をつけないといけないのか？</a:t>
             </a:r>
             <a:endParaRPr kumimoji="1" lang="en-US" altLang="ja-JP" dirty="0">
               <a:latin typeface="Arial" panose="020B0604020202020204" pitchFamily="34" charset="0"/>
@@ -36235,12 +36208,30 @@
             </a:endParaRPr>
           </a:p>
           <a:p>
+            <a:pPr marL="342900" indent="-342900">
+              <a:buFont typeface="Arial" panose="020B0604020202020204" pitchFamily="34" charset="0"/>
+              <a:buChar char="•"/>
+            </a:pPr>
             <a:r>
               <a:rPr kumimoji="1" lang="ja-JP" altLang="en-US" dirty="0">
                 <a:latin typeface="Arial" panose="020B0604020202020204" pitchFamily="34" charset="0"/>
                 <a:cs typeface="Arial" panose="020B0604020202020204" pitchFamily="34" charset="0"/>
               </a:rPr>
-              <a:t>　・文法に厳しく、複雑なコードを書かせない仕様（継承が使えないなど）</a:t>
+              <a:t>そのために、</a:t>
+            </a:r>
+            <a:r>
+              <a:rPr kumimoji="1" lang="en-US" altLang="ja-JP" dirty="0">
+                <a:latin typeface="Arial" panose="020B0604020202020204" pitchFamily="34" charset="0"/>
+                <a:cs typeface="Arial" panose="020B0604020202020204" pitchFamily="34" charset="0"/>
+              </a:rPr>
+              <a:t>Spring</a:t>
+            </a:r>
+            <a:r>
+              <a:rPr kumimoji="1" lang="ja-JP" altLang="en-US" dirty="0">
+                <a:latin typeface="Arial" panose="020B0604020202020204" pitchFamily="34" charset="0"/>
+                <a:cs typeface="Arial" panose="020B0604020202020204" pitchFamily="34" charset="0"/>
+              </a:rPr>
+              <a:t>がどのように活用できるか。</a:t>
             </a:r>
             <a:endParaRPr kumimoji="1" lang="en-US" altLang="ja-JP" dirty="0">
               <a:latin typeface="Arial" panose="020B0604020202020204" pitchFamily="34" charset="0"/>
@@ -36248,296 +36239,28 @@
             </a:endParaRPr>
           </a:p>
           <a:p>
+            <a:pPr marL="342900" indent="-342900">
+              <a:buFont typeface="Arial" panose="020B0604020202020204" pitchFamily="34" charset="0"/>
+              <a:buChar char="•"/>
+            </a:pPr>
             <a:r>
               <a:rPr kumimoji="1" lang="ja-JP" altLang="en-US" dirty="0">
                 <a:latin typeface="Arial" panose="020B0604020202020204" pitchFamily="34" charset="0"/>
                 <a:cs typeface="Arial" panose="020B0604020202020204" pitchFamily="34" charset="0"/>
               </a:rPr>
-              <a:t>　・言語としてのパフォーマンスが高い（</a:t>
-            </a:r>
-            <a:r>
-              <a:rPr kumimoji="1" lang="en-US" altLang="ja-JP" dirty="0">
-                <a:latin typeface="Arial" panose="020B0604020202020204" pitchFamily="34" charset="0"/>
-                <a:cs typeface="Arial" panose="020B0604020202020204" pitchFamily="34" charset="0"/>
-              </a:rPr>
-              <a:t>C</a:t>
-            </a:r>
-            <a:r>
-              <a:rPr kumimoji="1" lang="ja-JP" altLang="en-US" dirty="0">
-                <a:latin typeface="Arial" panose="020B0604020202020204" pitchFamily="34" charset="0"/>
-                <a:cs typeface="Arial" panose="020B0604020202020204" pitchFamily="34" charset="0"/>
-              </a:rPr>
-              <a:t>言語に匹敵する速度）</a:t>
+              <a:t>他の言語のフレームワークを探す上での指針を示す。</a:t>
             </a:r>
             <a:endParaRPr kumimoji="1" lang="en-US" altLang="ja-JP" dirty="0">
               <a:latin typeface="Arial" panose="020B0604020202020204" pitchFamily="34" charset="0"/>
               <a:cs typeface="Arial" panose="020B0604020202020204" pitchFamily="34" charset="0"/>
             </a:endParaRPr>
           </a:p>
-          <a:p>
-            <a:r>
-              <a:rPr kumimoji="1" lang="ja-JP" altLang="en-US" dirty="0">
-                <a:latin typeface="Arial" panose="020B0604020202020204" pitchFamily="34" charset="0"/>
-                <a:cs typeface="Arial" panose="020B0604020202020204" pitchFamily="34" charset="0"/>
-              </a:rPr>
-              <a:t>　・並列処理が比較的簡単に書ける</a:t>
-            </a:r>
-            <a:endParaRPr kumimoji="1" lang="en-US" altLang="ja-JP" dirty="0">
-              <a:latin typeface="Arial" panose="020B0604020202020204" pitchFamily="34" charset="0"/>
-              <a:cs typeface="Arial" panose="020B0604020202020204" pitchFamily="34" charset="0"/>
-            </a:endParaRPr>
-          </a:p>
-          <a:p>
-            <a:r>
-              <a:rPr kumimoji="1" lang="ja-JP" altLang="en-US" dirty="0">
-                <a:latin typeface="Arial" panose="020B0604020202020204" pitchFamily="34" charset="0"/>
-                <a:cs typeface="Arial" panose="020B0604020202020204" pitchFamily="34" charset="0"/>
-              </a:rPr>
-              <a:t>　・</a:t>
-            </a:r>
-            <a:r>
-              <a:rPr kumimoji="1" lang="en-US" altLang="ja-JP" dirty="0">
-                <a:latin typeface="Arial" panose="020B0604020202020204" pitchFamily="34" charset="0"/>
-                <a:cs typeface="Arial" panose="020B0604020202020204" pitchFamily="34" charset="0"/>
-              </a:rPr>
-              <a:t>Web</a:t>
-            </a:r>
-            <a:r>
-              <a:rPr kumimoji="1" lang="ja-JP" altLang="en-US" dirty="0">
-                <a:latin typeface="Arial" panose="020B0604020202020204" pitchFamily="34" charset="0"/>
-                <a:cs typeface="Arial" panose="020B0604020202020204" pitchFamily="34" charset="0"/>
-              </a:rPr>
-              <a:t>アプリケーション開発に必要なライブラリを標準搭載</a:t>
-            </a:r>
-            <a:endParaRPr kumimoji="1" lang="en-US" altLang="ja-JP" dirty="0">
-              <a:latin typeface="Arial" panose="020B0604020202020204" pitchFamily="34" charset="0"/>
-              <a:cs typeface="Arial" panose="020B0604020202020204" pitchFamily="34" charset="0"/>
-            </a:endParaRPr>
-          </a:p>
-          <a:p>
-            <a:r>
-              <a:rPr kumimoji="1" lang="ja-JP" altLang="en-US" dirty="0">
-                <a:latin typeface="Arial" panose="020B0604020202020204" pitchFamily="34" charset="0"/>
-                <a:cs typeface="Arial" panose="020B0604020202020204" pitchFamily="34" charset="0"/>
-              </a:rPr>
-              <a:t>　⇒ 言語レベルでのサポートが強力！</a:t>
-            </a:r>
-            <a:endParaRPr kumimoji="1" lang="en-US" altLang="ja-JP" dirty="0">
-              <a:latin typeface="Arial" panose="020B0604020202020204" pitchFamily="34" charset="0"/>
-              <a:cs typeface="Arial" panose="020B0604020202020204" pitchFamily="34" charset="0"/>
-            </a:endParaRPr>
-          </a:p>
-          <a:p>
-            <a:r>
-              <a:rPr kumimoji="1" lang="ja-JP" altLang="en-US" dirty="0">
-                <a:latin typeface="Arial" panose="020B0604020202020204" pitchFamily="34" charset="0"/>
-                <a:cs typeface="Arial" panose="020B0604020202020204" pitchFamily="34" charset="0"/>
-              </a:rPr>
-              <a:t>　⇒ユーザのアクセスが多い</a:t>
-            </a:r>
-            <a:r>
-              <a:rPr kumimoji="1" lang="en-US" altLang="ja-JP" dirty="0">
-                <a:latin typeface="Arial" panose="020B0604020202020204" pitchFamily="34" charset="0"/>
-                <a:cs typeface="Arial" panose="020B0604020202020204" pitchFamily="34" charset="0"/>
-              </a:rPr>
-              <a:t>EC</a:t>
-            </a:r>
-            <a:r>
-              <a:rPr kumimoji="1" lang="ja-JP" altLang="en-US" dirty="0">
-                <a:latin typeface="Arial" panose="020B0604020202020204" pitchFamily="34" charset="0"/>
-                <a:cs typeface="Arial" panose="020B0604020202020204" pitchFamily="34" charset="0"/>
-              </a:rPr>
-              <a:t>サイトを始めとする</a:t>
-            </a:r>
-            <a:r>
-              <a:rPr kumimoji="1" lang="en-US" altLang="ja-JP" dirty="0" err="1">
-                <a:latin typeface="Arial" panose="020B0604020202020204" pitchFamily="34" charset="0"/>
-                <a:cs typeface="Arial" panose="020B0604020202020204" pitchFamily="34" charset="0"/>
-              </a:rPr>
-              <a:t>BtoC</a:t>
-            </a:r>
-            <a:r>
-              <a:rPr kumimoji="1" lang="ja-JP" altLang="en-US" dirty="0">
-                <a:latin typeface="Arial" panose="020B0604020202020204" pitchFamily="34" charset="0"/>
-                <a:cs typeface="Arial" panose="020B0604020202020204" pitchFamily="34" charset="0"/>
-              </a:rPr>
-              <a:t>ビジネス向け</a:t>
-            </a:r>
-            <a:endParaRPr kumimoji="1" lang="en-US" altLang="ja-JP" dirty="0">
-              <a:latin typeface="Arial" panose="020B0604020202020204" pitchFamily="34" charset="0"/>
-              <a:cs typeface="Arial" panose="020B0604020202020204" pitchFamily="34" charset="0"/>
-            </a:endParaRPr>
-          </a:p>
-          <a:p>
-            <a:r>
-              <a:rPr kumimoji="1" lang="ja-JP" altLang="en-US" dirty="0">
-                <a:latin typeface="Arial" panose="020B0604020202020204" pitchFamily="34" charset="0"/>
-                <a:cs typeface="Arial" panose="020B0604020202020204" pitchFamily="34" charset="0"/>
-              </a:rPr>
-              <a:t>　</a:t>
-            </a:r>
-            <a:endParaRPr kumimoji="1" lang="en-US" altLang="ja-JP" dirty="0">
-              <a:latin typeface="Arial" panose="020B0604020202020204" pitchFamily="34" charset="0"/>
-              <a:cs typeface="Arial" panose="020B0604020202020204" pitchFamily="34" charset="0"/>
-            </a:endParaRPr>
-          </a:p>
-          <a:p>
-            <a:r>
-              <a:rPr kumimoji="1" lang="ja-JP" altLang="en-US" dirty="0">
-                <a:latin typeface="Arial" panose="020B0604020202020204" pitchFamily="34" charset="0"/>
-                <a:cs typeface="Arial" panose="020B0604020202020204" pitchFamily="34" charset="0"/>
-              </a:rPr>
-              <a:t>　</a:t>
-            </a:r>
-            <a:r>
-              <a:rPr kumimoji="1" lang="ja-JP" altLang="en-US" u="sng" dirty="0">
-                <a:latin typeface="Arial" panose="020B0604020202020204" pitchFamily="34" charset="0"/>
-                <a:cs typeface="Arial" panose="020B0604020202020204" pitchFamily="34" charset="0"/>
-              </a:rPr>
-              <a:t>短所</a:t>
-            </a:r>
-            <a:endParaRPr kumimoji="1" lang="en-US" altLang="ja-JP" u="sng" dirty="0">
-              <a:latin typeface="Arial" panose="020B0604020202020204" pitchFamily="34" charset="0"/>
-              <a:cs typeface="Arial" panose="020B0604020202020204" pitchFamily="34" charset="0"/>
-            </a:endParaRPr>
-          </a:p>
-          <a:p>
-            <a:r>
-              <a:rPr kumimoji="1" lang="ja-JP" altLang="en-US" dirty="0">
-                <a:latin typeface="Arial" panose="020B0604020202020204" pitchFamily="34" charset="0"/>
-                <a:cs typeface="Arial" panose="020B0604020202020204" pitchFamily="34" charset="0"/>
-              </a:rPr>
-              <a:t>　・</a:t>
-            </a:r>
-            <a:r>
-              <a:rPr kumimoji="1" lang="en-US" altLang="ja-JP" dirty="0">
-                <a:latin typeface="Arial" panose="020B0604020202020204" pitchFamily="34" charset="0"/>
-                <a:cs typeface="Arial" panose="020B0604020202020204" pitchFamily="34" charset="0"/>
-              </a:rPr>
-              <a:t>Web</a:t>
-            </a:r>
-            <a:r>
-              <a:rPr kumimoji="1" lang="ja-JP" altLang="en-US" dirty="0">
-                <a:latin typeface="Arial" panose="020B0604020202020204" pitchFamily="34" charset="0"/>
-                <a:cs typeface="Arial" panose="020B0604020202020204" pitchFamily="34" charset="0"/>
-              </a:rPr>
-              <a:t>系フレームワークとして決定版となるものがない</a:t>
-            </a:r>
-            <a:r>
-              <a:rPr kumimoji="1" lang="en-US" altLang="ja-JP" dirty="0">
-                <a:latin typeface="Arial" panose="020B0604020202020204" pitchFamily="34" charset="0"/>
-                <a:cs typeface="Arial" panose="020B0604020202020204" pitchFamily="34" charset="0"/>
-              </a:rPr>
-              <a:t>…</a:t>
-            </a:r>
-          </a:p>
-          <a:p>
-            <a:r>
-              <a:rPr kumimoji="1" lang="ja-JP" altLang="en-US" dirty="0">
-                <a:latin typeface="Arial" panose="020B0604020202020204" pitchFamily="34" charset="0"/>
-                <a:cs typeface="Arial" panose="020B0604020202020204" pitchFamily="34" charset="0"/>
-              </a:rPr>
-              <a:t>　・</a:t>
-            </a:r>
-            <a:r>
-              <a:rPr kumimoji="1" lang="en-US" altLang="ja-JP" dirty="0">
-                <a:latin typeface="Arial" panose="020B0604020202020204" pitchFamily="34" charset="0"/>
-                <a:cs typeface="Arial" panose="020B0604020202020204" pitchFamily="34" charset="0"/>
-              </a:rPr>
-              <a:t>Web</a:t>
-            </a:r>
-            <a:r>
-              <a:rPr kumimoji="1" lang="ja-JP" altLang="en-US" dirty="0">
-                <a:latin typeface="Arial" panose="020B0604020202020204" pitchFamily="34" charset="0"/>
-                <a:cs typeface="Arial" panose="020B0604020202020204" pitchFamily="34" charset="0"/>
-              </a:rPr>
-              <a:t>や書籍などで得られる情報が少ない</a:t>
-            </a:r>
-            <a:r>
-              <a:rPr kumimoji="1" lang="en-US" altLang="ja-JP" dirty="0">
-                <a:latin typeface="Arial" panose="020B0604020202020204" pitchFamily="34" charset="0"/>
-                <a:cs typeface="Arial" panose="020B0604020202020204" pitchFamily="34" charset="0"/>
-              </a:rPr>
-              <a:t>…</a:t>
-            </a:r>
-          </a:p>
-          <a:p>
-            <a:r>
-              <a:rPr kumimoji="1" lang="ja-JP" altLang="en-US" dirty="0">
-                <a:latin typeface="Arial" panose="020B0604020202020204" pitchFamily="34" charset="0"/>
-                <a:cs typeface="Arial" panose="020B0604020202020204" pitchFamily="34" charset="0"/>
-              </a:rPr>
-              <a:t>　・企業での採用事例に乏しい</a:t>
-            </a:r>
-            <a:r>
-              <a:rPr kumimoji="1" lang="en-US" altLang="ja-JP" dirty="0">
-                <a:latin typeface="Arial" panose="020B0604020202020204" pitchFamily="34" charset="0"/>
-                <a:cs typeface="Arial" panose="020B0604020202020204" pitchFamily="34" charset="0"/>
-              </a:rPr>
-              <a:t>…</a:t>
-            </a:r>
-          </a:p>
-          <a:p>
-            <a:r>
-              <a:rPr kumimoji="1" lang="ja-JP" altLang="en-US" dirty="0">
-                <a:latin typeface="Arial" panose="020B0604020202020204" pitchFamily="34" charset="0"/>
-                <a:cs typeface="Arial" panose="020B0604020202020204" pitchFamily="34" charset="0"/>
-              </a:rPr>
-              <a:t>　・</a:t>
-            </a:r>
-            <a:r>
-              <a:rPr kumimoji="1" lang="en-US" altLang="ja-JP" dirty="0">
-                <a:latin typeface="Arial" panose="020B0604020202020204" pitchFamily="34" charset="0"/>
-                <a:cs typeface="Arial" panose="020B0604020202020204" pitchFamily="34" charset="0"/>
-              </a:rPr>
-              <a:t>REST API</a:t>
-            </a:r>
-            <a:r>
-              <a:rPr kumimoji="1" lang="ja-JP" altLang="en-US" dirty="0">
-                <a:latin typeface="Arial" panose="020B0604020202020204" pitchFamily="34" charset="0"/>
-                <a:cs typeface="Arial" panose="020B0604020202020204" pitchFamily="34" charset="0"/>
-              </a:rPr>
-              <a:t>サーバ作成用で、</a:t>
-            </a:r>
-            <a:r>
-              <a:rPr kumimoji="1" lang="en-US" altLang="ja-JP" dirty="0">
-                <a:latin typeface="Arial" panose="020B0604020202020204" pitchFamily="34" charset="0"/>
-                <a:cs typeface="Arial" panose="020B0604020202020204" pitchFamily="34" charset="0"/>
-              </a:rPr>
-              <a:t>View</a:t>
-            </a:r>
-            <a:r>
-              <a:rPr kumimoji="1" lang="ja-JP" altLang="en-US" dirty="0">
-                <a:latin typeface="Arial" panose="020B0604020202020204" pitchFamily="34" charset="0"/>
-                <a:cs typeface="Arial" panose="020B0604020202020204" pitchFamily="34" charset="0"/>
-              </a:rPr>
-              <a:t>（</a:t>
-            </a:r>
-            <a:r>
-              <a:rPr kumimoji="1" lang="en-US" altLang="ja-JP" dirty="0">
-                <a:latin typeface="Arial" panose="020B0604020202020204" pitchFamily="34" charset="0"/>
-                <a:cs typeface="Arial" panose="020B0604020202020204" pitchFamily="34" charset="0"/>
-              </a:rPr>
-              <a:t>JSP</a:t>
-            </a:r>
-            <a:r>
-              <a:rPr kumimoji="1" lang="ja-JP" altLang="en-US" dirty="0">
-                <a:latin typeface="Arial" panose="020B0604020202020204" pitchFamily="34" charset="0"/>
-                <a:cs typeface="Arial" panose="020B0604020202020204" pitchFamily="34" charset="0"/>
-              </a:rPr>
-              <a:t>など）のサポートに乏しい</a:t>
-            </a:r>
-            <a:endParaRPr kumimoji="1" lang="en-US" altLang="ja-JP" dirty="0">
-              <a:latin typeface="Arial" panose="020B0604020202020204" pitchFamily="34" charset="0"/>
-              <a:cs typeface="Arial" panose="020B0604020202020204" pitchFamily="34" charset="0"/>
-            </a:endParaRPr>
-          </a:p>
         </p:txBody>
       </p:sp>
     </p:spTree>
     <p:extLst>
       <p:ext uri="{BB962C8B-B14F-4D97-AF65-F5344CB8AC3E}">
-        <p14:creationId xmlns:p14="http://schemas.microsoft.com/office/powerpoint/2010/main" val="2932536701"/>
+        <p14:creationId xmlns:p14="http://schemas.microsoft.com/office/powerpoint/2010/main" val="1630446635"/>
       </p:ext>
     </p:extLst>
   </p:cSld>
@@ -36682,10 +36405,10 @@
       </p:sp>
       <p:sp>
         <p:nvSpPr>
-          <p:cNvPr id="6" name="テキスト ボックス 5">
-            <a:extLst>
-              <a:ext uri="{FF2B5EF4-FFF2-40B4-BE49-F238E27FC236}">
-                <a16:creationId xmlns:a16="http://schemas.microsoft.com/office/drawing/2014/main" id="{14123972-50C6-41A6-BC9E-54539A2FFD7C}"/>
+          <p:cNvPr id="7" name="テキスト ボックス 6">
+            <a:extLst>
+              <a:ext uri="{FF2B5EF4-FFF2-40B4-BE49-F238E27FC236}">
+                <a16:creationId xmlns:a16="http://schemas.microsoft.com/office/drawing/2014/main" id="{D5B4DBB9-8190-4662-946D-489083AE3614}"/>
               </a:ext>
             </a:extLst>
           </p:cNvPr>
@@ -36694,8 +36417,8 @@
         </p:nvSpPr>
         <p:spPr>
           <a:xfrm>
-            <a:off x="630423" y="944823"/>
-            <a:ext cx="7252727" cy="1015663"/>
+            <a:off x="519673" y="1224814"/>
+            <a:ext cx="8104653" cy="4616648"/>
           </a:xfrm>
           <a:prstGeom prst="rect">
             <a:avLst/>
@@ -36713,7 +36436,7 @@
                 <a:latin typeface="Arial" panose="020B0604020202020204" pitchFamily="34" charset="0"/>
                 <a:cs typeface="Arial" panose="020B0604020202020204" pitchFamily="34" charset="0"/>
               </a:rPr>
-              <a:t>疑問</a:t>
+              <a:t>自分なりの答え</a:t>
             </a:r>
             <a:endParaRPr kumimoji="1" lang="en-US" altLang="ja-JP" sz="2000" b="1" u="sng" dirty="0">
               <a:latin typeface="Arial" panose="020B0604020202020204" pitchFamily="34" charset="0"/>
@@ -36722,25 +36445,66 @@
           </a:p>
           <a:p>
             <a:r>
+              <a:rPr kumimoji="1" lang="ja-JP" altLang="en-US" b="1" dirty="0">
+                <a:latin typeface="Arial" panose="020B0604020202020204" pitchFamily="34" charset="0"/>
+                <a:cs typeface="Arial" panose="020B0604020202020204" pitchFamily="34" charset="0"/>
+              </a:rPr>
+              <a:t>（１）</a:t>
+            </a:r>
+            <a:r>
+              <a:rPr kumimoji="1" lang="en-US" altLang="ja-JP" b="1" dirty="0">
+                <a:latin typeface="Arial" panose="020B0604020202020204" pitchFamily="34" charset="0"/>
+                <a:cs typeface="Arial" panose="020B0604020202020204" pitchFamily="34" charset="0"/>
+              </a:rPr>
+              <a:t>Go</a:t>
+            </a:r>
+            <a:r>
+              <a:rPr kumimoji="1" lang="ja-JP" altLang="en-US" b="1" dirty="0">
+                <a:latin typeface="Arial" panose="020B0604020202020204" pitchFamily="34" charset="0"/>
+                <a:cs typeface="Arial" panose="020B0604020202020204" pitchFamily="34" charset="0"/>
+              </a:rPr>
+              <a:t>言語（</a:t>
+            </a:r>
+            <a:r>
+              <a:rPr kumimoji="1" lang="en-US" altLang="ja-JP" b="1" dirty="0">
+                <a:latin typeface="Arial" panose="020B0604020202020204" pitchFamily="34" charset="0"/>
+                <a:cs typeface="Arial" panose="020B0604020202020204" pitchFamily="34" charset="0"/>
+              </a:rPr>
+              <a:t>Golang</a:t>
+            </a:r>
+            <a:r>
+              <a:rPr kumimoji="1" lang="ja-JP" altLang="en-US" b="1" dirty="0">
+                <a:latin typeface="Arial" panose="020B0604020202020204" pitchFamily="34" charset="0"/>
+                <a:cs typeface="Arial" panose="020B0604020202020204" pitchFamily="34" charset="0"/>
+              </a:rPr>
+              <a:t>）</a:t>
+            </a:r>
+            <a:endParaRPr kumimoji="1" lang="en-US" altLang="ja-JP" b="1" dirty="0">
+              <a:latin typeface="Arial" panose="020B0604020202020204" pitchFamily="34" charset="0"/>
+              <a:cs typeface="Arial" panose="020B0604020202020204" pitchFamily="34" charset="0"/>
+            </a:endParaRPr>
+          </a:p>
+          <a:p>
+            <a:r>
               <a:rPr kumimoji="1" lang="ja-JP" altLang="en-US" dirty="0">
                 <a:latin typeface="Arial" panose="020B0604020202020204" pitchFamily="34" charset="0"/>
                 <a:cs typeface="Arial" panose="020B0604020202020204" pitchFamily="34" charset="0"/>
               </a:rPr>
-              <a:t>新規に</a:t>
-            </a:r>
-            <a:r>
-              <a:rPr kumimoji="1" lang="en-US" altLang="ja-JP" dirty="0">
-                <a:latin typeface="Arial" panose="020B0604020202020204" pitchFamily="34" charset="0"/>
-                <a:cs typeface="Arial" panose="020B0604020202020204" pitchFamily="34" charset="0"/>
-              </a:rPr>
-              <a:t>Web</a:t>
+              <a:t>　</a:t>
+            </a:r>
+            <a:r>
+              <a:rPr kumimoji="1" lang="ja-JP" altLang="en-US" u="sng" dirty="0">
+                <a:latin typeface="Arial" panose="020B0604020202020204" pitchFamily="34" charset="0"/>
+                <a:cs typeface="Arial" panose="020B0604020202020204" pitchFamily="34" charset="0"/>
+              </a:rPr>
+              <a:t>長所</a:t>
             </a:r>
             <a:r>
               <a:rPr kumimoji="1" lang="ja-JP" altLang="en-US" dirty="0">
                 <a:latin typeface="Arial" panose="020B0604020202020204" pitchFamily="34" charset="0"/>
                 <a:cs typeface="Arial" panose="020B0604020202020204" pitchFamily="34" charset="0"/>
               </a:rPr>
-              <a:t>アプリケーションを開発するとして、</a:t>
+              <a:t>　</a:t>
             </a:r>
             <a:endParaRPr kumimoji="1" lang="en-US" altLang="ja-JP" dirty="0">
               <a:latin typeface="Arial" panose="020B0604020202020204" pitchFamily="34" charset="0"/>
@@ -36753,113 +36517,21 @@
                 <a:latin typeface="Arial" panose="020B0604020202020204" pitchFamily="34" charset="0"/>
                 <a:cs typeface="Arial" panose="020B0604020202020204" pitchFamily="34" charset="0"/>
               </a:rPr>
-              <a:t>バックエンドを開発する上で最良の言語は何か？</a:t>
-            </a:r>
-          </a:p>
-        </p:txBody>
-      </p:sp>
-      <p:sp>
-        <p:nvSpPr>
-          <p:cNvPr id="7" name="テキスト ボックス 6">
-            <a:extLst>
-              <a:ext uri="{FF2B5EF4-FFF2-40B4-BE49-F238E27FC236}">
-                <a16:creationId xmlns:a16="http://schemas.microsoft.com/office/drawing/2014/main" id="{D5B4DBB9-8190-4662-946D-489083AE3614}"/>
-              </a:ext>
-            </a:extLst>
-          </p:cNvPr>
-          <p:cNvSpPr txBox="1"/>
-          <p:nvPr/>
-        </p:nvSpPr>
-        <p:spPr>
-          <a:xfrm>
-            <a:off x="630422" y="2221764"/>
-            <a:ext cx="8104653" cy="4616648"/>
-          </a:xfrm>
-          <a:prstGeom prst="rect">
-            <a:avLst/>
-          </a:prstGeom>
-          <a:noFill/>
-        </p:spPr>
-        <p:txBody>
-          <a:bodyPr wrap="square" rtlCol="0">
-            <a:spAutoFit/>
-          </a:bodyPr>
-          <a:lstStyle/>
-          <a:p>
-            <a:r>
-              <a:rPr kumimoji="1" lang="ja-JP" altLang="en-US" sz="2400" b="1" u="sng" dirty="0">
-                <a:latin typeface="Arial" panose="020B0604020202020204" pitchFamily="34" charset="0"/>
-                <a:cs typeface="Arial" panose="020B0604020202020204" pitchFamily="34" charset="0"/>
-              </a:rPr>
-              <a:t>自分なりの答え</a:t>
-            </a:r>
-            <a:endParaRPr kumimoji="1" lang="en-US" altLang="ja-JP" sz="2000" b="1" u="sng" dirty="0">
-              <a:latin typeface="Arial" panose="020B0604020202020204" pitchFamily="34" charset="0"/>
-              <a:cs typeface="Arial" panose="020B0604020202020204" pitchFamily="34" charset="0"/>
-            </a:endParaRPr>
-          </a:p>
-          <a:p>
-            <a:r>
-              <a:rPr kumimoji="1" lang="ja-JP" altLang="en-US" b="1" dirty="0">
-                <a:latin typeface="Arial" panose="020B0604020202020204" pitchFamily="34" charset="0"/>
-                <a:cs typeface="Arial" panose="020B0604020202020204" pitchFamily="34" charset="0"/>
-              </a:rPr>
-              <a:t>（１）</a:t>
-            </a:r>
-            <a:r>
-              <a:rPr kumimoji="1" lang="en-US" altLang="ja-JP" b="1" dirty="0">
-                <a:latin typeface="Arial" panose="020B0604020202020204" pitchFamily="34" charset="0"/>
-                <a:cs typeface="Arial" panose="020B0604020202020204" pitchFamily="34" charset="0"/>
-              </a:rPr>
-              <a:t>Go</a:t>
-            </a:r>
-            <a:r>
-              <a:rPr kumimoji="1" lang="ja-JP" altLang="en-US" b="1" dirty="0">
-                <a:latin typeface="Arial" panose="020B0604020202020204" pitchFamily="34" charset="0"/>
-                <a:cs typeface="Arial" panose="020B0604020202020204" pitchFamily="34" charset="0"/>
-              </a:rPr>
-              <a:t>言語（</a:t>
-            </a:r>
-            <a:r>
-              <a:rPr kumimoji="1" lang="en-US" altLang="ja-JP" b="1" dirty="0">
-                <a:latin typeface="Arial" panose="020B0604020202020204" pitchFamily="34" charset="0"/>
-                <a:cs typeface="Arial" panose="020B0604020202020204" pitchFamily="34" charset="0"/>
-              </a:rPr>
-              <a:t>Golang</a:t>
-            </a:r>
-            <a:r>
-              <a:rPr kumimoji="1" lang="ja-JP" altLang="en-US" b="1" dirty="0">
-                <a:latin typeface="Arial" panose="020B0604020202020204" pitchFamily="34" charset="0"/>
-                <a:cs typeface="Arial" panose="020B0604020202020204" pitchFamily="34" charset="0"/>
-              </a:rPr>
-              <a:t>）</a:t>
-            </a:r>
-            <a:endParaRPr kumimoji="1" lang="en-US" altLang="ja-JP" b="1" dirty="0">
-              <a:latin typeface="Arial" panose="020B0604020202020204" pitchFamily="34" charset="0"/>
-              <a:cs typeface="Arial" panose="020B0604020202020204" pitchFamily="34" charset="0"/>
-            </a:endParaRPr>
-          </a:p>
-          <a:p>
+              <a:t>　・</a:t>
+            </a:r>
+            <a:r>
+              <a:rPr kumimoji="1" lang="en-US" altLang="ja-JP" dirty="0">
+                <a:latin typeface="Arial" panose="020B0604020202020204" pitchFamily="34" charset="0"/>
+                <a:cs typeface="Arial" panose="020B0604020202020204" pitchFamily="34" charset="0"/>
+              </a:rPr>
+              <a:t>Google</a:t>
+            </a:r>
             <a:r>
               <a:rPr kumimoji="1" lang="ja-JP" altLang="en-US" dirty="0">
                 <a:latin typeface="Arial" panose="020B0604020202020204" pitchFamily="34" charset="0"/>
                 <a:cs typeface="Arial" panose="020B0604020202020204" pitchFamily="34" charset="0"/>
               </a:rPr>
-              <a:t>　</a:t>
-            </a:r>
-            <a:r>
-              <a:rPr kumimoji="1" lang="ja-JP" altLang="en-US" u="sng" dirty="0">
-                <a:latin typeface="Arial" panose="020B0604020202020204" pitchFamily="34" charset="0"/>
-                <a:cs typeface="Arial" panose="020B0604020202020204" pitchFamily="34" charset="0"/>
-              </a:rPr>
-              <a:t>長所</a:t>
-            </a:r>
-            <a:r>
-              <a:rPr kumimoji="1" lang="ja-JP" altLang="en-US" dirty="0">
-                <a:latin typeface="Arial" panose="020B0604020202020204" pitchFamily="34" charset="0"/>
-                <a:cs typeface="Arial" panose="020B0604020202020204" pitchFamily="34" charset="0"/>
-              </a:rPr>
-              <a:t>　</a:t>
+              <a:t>発のプログラミング言語</a:t>
             </a:r>
             <a:endParaRPr kumimoji="1" lang="en-US" altLang="ja-JP" dirty="0">
               <a:latin typeface="Arial" panose="020B0604020202020204" pitchFamily="34" charset="0"/>
@@ -36872,21 +36544,7 @@
                 <a:latin typeface="Arial" panose="020B0604020202020204" pitchFamily="34" charset="0"/>
                 <a:cs typeface="Arial" panose="020B0604020202020204" pitchFamily="34" charset="0"/>
               </a:rPr>
-              <a:t>　・</a:t>
-            </a:r>
-            <a:r>
-              <a:rPr kumimoji="1" lang="en-US" altLang="ja-JP" dirty="0">
-                <a:latin typeface="Arial" panose="020B0604020202020204" pitchFamily="34" charset="0"/>
-                <a:cs typeface="Arial" panose="020B0604020202020204" pitchFamily="34" charset="0"/>
-              </a:rPr>
-              <a:t>Google</a:t>
-            </a:r>
-            <a:r>
-              <a:rPr kumimoji="1" lang="ja-JP" altLang="en-US" dirty="0">
-                <a:latin typeface="Arial" panose="020B0604020202020204" pitchFamily="34" charset="0"/>
-                <a:cs typeface="Arial" panose="020B0604020202020204" pitchFamily="34" charset="0"/>
-              </a:rPr>
-              <a:t>発のプログラミング言語</a:t>
+              <a:t>　・文法に厳しく、複雑なコードを書かせない仕様（継承が使えないなど）</a:t>
             </a:r>
             <a:endParaRPr kumimoji="1" lang="en-US" altLang="ja-JP" dirty="0">
               <a:latin typeface="Arial" panose="020B0604020202020204" pitchFamily="34" charset="0"/>
@@ -36899,7 +36557,21 @@
                 <a:latin typeface="Arial" panose="020B0604020202020204" pitchFamily="34" charset="0"/>
                 <a:cs typeface="Arial" panose="020B0604020202020204" pitchFamily="34" charset="0"/>
               </a:rPr>
-              <a:t>　・文法に厳しく、複雑なコードを書かせない仕様（継承が使えないなど）</a:t>
+              <a:t>　・言語としてのパフォーマンスが高い（</a:t>
+            </a:r>
+            <a:r>
+              <a:rPr kumimoji="1" lang="en-US" altLang="ja-JP" dirty="0">
+                <a:latin typeface="Arial" panose="020B0604020202020204" pitchFamily="34" charset="0"/>
+                <a:cs typeface="Arial" panose="020B0604020202020204" pitchFamily="34" charset="0"/>
+              </a:rPr>
+              <a:t>C</a:t>
+            </a:r>
+            <a:r>
+              <a:rPr kumimoji="1" lang="ja-JP" altLang="en-US" dirty="0">
+                <a:latin typeface="Arial" panose="020B0604020202020204" pitchFamily="34" charset="0"/>
+                <a:cs typeface="Arial" panose="020B0604020202020204" pitchFamily="34" charset="0"/>
+              </a:rPr>
+              <a:t>言語に匹敵する速度）</a:t>
             </a:r>
             <a:endParaRPr kumimoji="1" lang="en-US" altLang="ja-JP" dirty="0">
               <a:latin typeface="Arial" panose="020B0604020202020204" pitchFamily="34" charset="0"/>
@@ -36912,21 +36584,7 @@
                 <a:latin typeface="Arial" panose="020B0604020202020204" pitchFamily="34" charset="0"/>
                 <a:cs typeface="Arial" panose="020B0604020202020204" pitchFamily="34" charset="0"/>
               </a:rPr>
-              <a:t>　・言語としてのパフォーマンスが高い（</a:t>
-            </a:r>
-            <a:r>
-              <a:rPr kumimoji="1" lang="en-US" altLang="ja-JP" dirty="0">
-                <a:latin typeface="Arial" panose="020B0604020202020204" pitchFamily="34" charset="0"/>
-                <a:cs typeface="Arial" panose="020B0604020202020204" pitchFamily="34" charset="0"/>
-              </a:rPr>
-              <a:t>C</a:t>
-            </a:r>
-            <a:r>
-              <a:rPr kumimoji="1" lang="ja-JP" altLang="en-US" dirty="0">
-                <a:latin typeface="Arial" panose="020B0604020202020204" pitchFamily="34" charset="0"/>
-                <a:cs typeface="Arial" panose="020B0604020202020204" pitchFamily="34" charset="0"/>
-              </a:rPr>
-              <a:t>言語に匹敵する速度）</a:t>
+              <a:t>　・並列処理が比較的簡単に書ける</a:t>
             </a:r>
             <a:endParaRPr kumimoji="1" lang="en-US" altLang="ja-JP" dirty="0">
               <a:latin typeface="Arial" panose="020B0604020202020204" pitchFamily="34" charset="0"/>
@@ -36939,7 +36597,21 @@
                 <a:latin typeface="Arial" panose="020B0604020202020204" pitchFamily="34" charset="0"/>
                 <a:cs typeface="Arial" panose="020B0604020202020204" pitchFamily="34" charset="0"/>
               </a:rPr>
-              <a:t>　・並列処理が比較的簡単に書ける</a:t>
+              <a:t>　・</a:t>
+            </a:r>
+            <a:r>
+              <a:rPr kumimoji="1" lang="en-US" altLang="ja-JP" dirty="0">
+                <a:latin typeface="Arial" panose="020B0604020202020204" pitchFamily="34" charset="0"/>
+                <a:cs typeface="Arial" panose="020B0604020202020204" pitchFamily="34" charset="0"/>
+              </a:rPr>
+              <a:t>Web</a:t>
+            </a:r>
+            <a:r>
+              <a:rPr kumimoji="1" lang="ja-JP" altLang="en-US" dirty="0">
+                <a:latin typeface="Arial" panose="020B0604020202020204" pitchFamily="34" charset="0"/>
+                <a:cs typeface="Arial" panose="020B0604020202020204" pitchFamily="34" charset="0"/>
+              </a:rPr>
+              <a:t>アプリケーション開発に必要なライブラリを標準搭載</a:t>
             </a:r>
             <a:endParaRPr kumimoji="1" lang="en-US" altLang="ja-JP" dirty="0">
               <a:latin typeface="Arial" panose="020B0604020202020204" pitchFamily="34" charset="0"/>
@@ -36952,21 +36624,7 @@
                 <a:latin typeface="Arial" panose="020B0604020202020204" pitchFamily="34" charset="0"/>
                 <a:cs typeface="Arial" panose="020B0604020202020204" pitchFamily="34" charset="0"/>
               </a:rPr>
-              <a:t>　・</a:t>
-            </a:r>
-            <a:r>
-              <a:rPr kumimoji="1" lang="en-US" altLang="ja-JP" dirty="0">
-                <a:latin typeface="Arial" panose="020B0604020202020204" pitchFamily="34" charset="0"/>
-                <a:cs typeface="Arial" panose="020B0604020202020204" pitchFamily="34" charset="0"/>
-              </a:rPr>
-              <a:t>Web</a:t>
-            </a:r>
-            <a:r>
-              <a:rPr kumimoji="1" lang="ja-JP" altLang="en-US" dirty="0">
-                <a:latin typeface="Arial" panose="020B0604020202020204" pitchFamily="34" charset="0"/>
-                <a:cs typeface="Arial" panose="020B0604020202020204" pitchFamily="34" charset="0"/>
-              </a:rPr>
-              <a:t>アプリケーション開発に必要なライブラリを標準搭載</a:t>
+              <a:t>　⇒ 言語レベルでのサポートが強力！</a:t>
             </a:r>
             <a:endParaRPr kumimoji="1" lang="en-US" altLang="ja-JP" dirty="0">
               <a:latin typeface="Arial" panose="020B0604020202020204" pitchFamily="34" charset="0"/>
@@ -36979,7 +36637,35 @@
                 <a:latin typeface="Arial" panose="020B0604020202020204" pitchFamily="34" charset="0"/>
                 <a:cs typeface="Arial" panose="020B0604020202020204" pitchFamily="34" charset="0"/>
               </a:rPr>
-              <a:t>　⇒ 言語レベルでのサポートが強力！</a:t>
+              <a:t>　⇒ユーザのアクセスが多い</a:t>
+            </a:r>
+            <a:r>
+              <a:rPr kumimoji="1" lang="en-US" altLang="ja-JP" dirty="0">
+                <a:latin typeface="Arial" panose="020B0604020202020204" pitchFamily="34" charset="0"/>
+                <a:cs typeface="Arial" panose="020B0604020202020204" pitchFamily="34" charset="0"/>
+              </a:rPr>
+              <a:t>EC</a:t>
+            </a:r>
+            <a:r>
+              <a:rPr kumimoji="1" lang="ja-JP" altLang="en-US" dirty="0">
+                <a:latin typeface="Arial" panose="020B0604020202020204" pitchFamily="34" charset="0"/>
+                <a:cs typeface="Arial" panose="020B0604020202020204" pitchFamily="34" charset="0"/>
+              </a:rPr>
+              <a:t>サイトを始めとする</a:t>
+            </a:r>
+            <a:r>
+              <a:rPr kumimoji="1" lang="en-US" altLang="ja-JP" dirty="0" err="1">
+                <a:latin typeface="Arial" panose="020B0604020202020204" pitchFamily="34" charset="0"/>
+                <a:cs typeface="Arial" panose="020B0604020202020204" pitchFamily="34" charset="0"/>
+              </a:rPr>
+              <a:t>BtoC</a:t>
+            </a:r>
+            <a:r>
+              <a:rPr kumimoji="1" lang="ja-JP" altLang="en-US" dirty="0">
+                <a:latin typeface="Arial" panose="020B0604020202020204" pitchFamily="34" charset="0"/>
+                <a:cs typeface="Arial" panose="020B0604020202020204" pitchFamily="34" charset="0"/>
+              </a:rPr>
+              <a:t>ビジネス向け</a:t>
             </a:r>
             <a:endParaRPr kumimoji="1" lang="en-US" altLang="ja-JP" dirty="0">
               <a:latin typeface="Arial" panose="020B0604020202020204" pitchFamily="34" charset="0"/>
@@ -36992,35 +36678,7 @@
                 <a:latin typeface="Arial" panose="020B0604020202020204" pitchFamily="34" charset="0"/>
                 <a:cs typeface="Arial" panose="020B0604020202020204" pitchFamily="34" charset="0"/>
               </a:rPr>
-              <a:t>　⇒ユーザのアクセスが多い</a:t>
-            </a:r>
-            <a:r>
-              <a:rPr kumimoji="1" lang="en-US" altLang="ja-JP" dirty="0">
-                <a:latin typeface="Arial" panose="020B0604020202020204" pitchFamily="34" charset="0"/>
-                <a:cs typeface="Arial" panose="020B0604020202020204" pitchFamily="34" charset="0"/>
-              </a:rPr>
-              <a:t>EC</a:t>
-            </a:r>
-            <a:r>
-              <a:rPr kumimoji="1" lang="ja-JP" altLang="en-US" dirty="0">
-                <a:latin typeface="Arial" panose="020B0604020202020204" pitchFamily="34" charset="0"/>
-                <a:cs typeface="Arial" panose="020B0604020202020204" pitchFamily="34" charset="0"/>
-              </a:rPr>
-              <a:t>サイトを始めとする</a:t>
-            </a:r>
-            <a:r>
-              <a:rPr kumimoji="1" lang="en-US" altLang="ja-JP" dirty="0" err="1">
-                <a:latin typeface="Arial" panose="020B0604020202020204" pitchFamily="34" charset="0"/>
-                <a:cs typeface="Arial" panose="020B0604020202020204" pitchFamily="34" charset="0"/>
-              </a:rPr>
-              <a:t>BtoC</a:t>
-            </a:r>
-            <a:r>
-              <a:rPr kumimoji="1" lang="ja-JP" altLang="en-US" dirty="0">
-                <a:latin typeface="Arial" panose="020B0604020202020204" pitchFamily="34" charset="0"/>
-                <a:cs typeface="Arial" panose="020B0604020202020204" pitchFamily="34" charset="0"/>
-              </a:rPr>
-              <a:t>ビジネス向け</a:t>
+              <a:t>　</a:t>
             </a:r>
             <a:endParaRPr kumimoji="1" lang="en-US" altLang="ja-JP" dirty="0">
               <a:latin typeface="Arial" panose="020B0604020202020204" pitchFamily="34" charset="0"/>
@@ -37035,291 +36693,155 @@
               </a:rPr>
               <a:t>　</a:t>
             </a:r>
+            <a:r>
+              <a:rPr kumimoji="1" lang="ja-JP" altLang="en-US" u="sng" dirty="0">
+                <a:latin typeface="Arial" panose="020B0604020202020204" pitchFamily="34" charset="0"/>
+                <a:cs typeface="Arial" panose="020B0604020202020204" pitchFamily="34" charset="0"/>
+              </a:rPr>
+              <a:t>短所</a:t>
+            </a:r>
+            <a:endParaRPr kumimoji="1" lang="en-US" altLang="ja-JP" u="sng" dirty="0">
+              <a:latin typeface="Arial" panose="020B0604020202020204" pitchFamily="34" charset="0"/>
+              <a:cs typeface="Arial" panose="020B0604020202020204" pitchFamily="34" charset="0"/>
+            </a:endParaRPr>
+          </a:p>
+          <a:p>
+            <a:r>
+              <a:rPr kumimoji="1" lang="ja-JP" altLang="en-US" dirty="0">
+                <a:latin typeface="Arial" panose="020B0604020202020204" pitchFamily="34" charset="0"/>
+                <a:cs typeface="Arial" panose="020B0604020202020204" pitchFamily="34" charset="0"/>
+              </a:rPr>
+              <a:t>　・</a:t>
+            </a:r>
+            <a:r>
+              <a:rPr kumimoji="1" lang="en-US" altLang="ja-JP" dirty="0">
+                <a:latin typeface="Arial" panose="020B0604020202020204" pitchFamily="34" charset="0"/>
+                <a:cs typeface="Arial" panose="020B0604020202020204" pitchFamily="34" charset="0"/>
+              </a:rPr>
+              <a:t>Web</a:t>
+            </a:r>
+            <a:r>
+              <a:rPr kumimoji="1" lang="ja-JP" altLang="en-US" dirty="0">
+                <a:latin typeface="Arial" panose="020B0604020202020204" pitchFamily="34" charset="0"/>
+                <a:cs typeface="Arial" panose="020B0604020202020204" pitchFamily="34" charset="0"/>
+              </a:rPr>
+              <a:t>系フレームワークとして決定版となるものがない</a:t>
+            </a:r>
+            <a:r>
+              <a:rPr kumimoji="1" lang="en-US" altLang="ja-JP" dirty="0">
+                <a:latin typeface="Arial" panose="020B0604020202020204" pitchFamily="34" charset="0"/>
+                <a:cs typeface="Arial" panose="020B0604020202020204" pitchFamily="34" charset="0"/>
+              </a:rPr>
+              <a:t>…</a:t>
+            </a:r>
+          </a:p>
+          <a:p>
+            <a:r>
+              <a:rPr kumimoji="1" lang="ja-JP" altLang="en-US" dirty="0">
+                <a:latin typeface="Arial" panose="020B0604020202020204" pitchFamily="34" charset="0"/>
+                <a:cs typeface="Arial" panose="020B0604020202020204" pitchFamily="34" charset="0"/>
+              </a:rPr>
+              <a:t>　・</a:t>
+            </a:r>
+            <a:r>
+              <a:rPr kumimoji="1" lang="en-US" altLang="ja-JP" dirty="0">
+                <a:latin typeface="Arial" panose="020B0604020202020204" pitchFamily="34" charset="0"/>
+                <a:cs typeface="Arial" panose="020B0604020202020204" pitchFamily="34" charset="0"/>
+              </a:rPr>
+              <a:t>Web</a:t>
+            </a:r>
+            <a:r>
+              <a:rPr kumimoji="1" lang="ja-JP" altLang="en-US" dirty="0">
+                <a:latin typeface="Arial" panose="020B0604020202020204" pitchFamily="34" charset="0"/>
+                <a:cs typeface="Arial" panose="020B0604020202020204" pitchFamily="34" charset="0"/>
+              </a:rPr>
+              <a:t>や書籍などで得られる情報が少ない</a:t>
+            </a:r>
+            <a:r>
+              <a:rPr kumimoji="1" lang="en-US" altLang="ja-JP" dirty="0">
+                <a:latin typeface="Arial" panose="020B0604020202020204" pitchFamily="34" charset="0"/>
+                <a:cs typeface="Arial" panose="020B0604020202020204" pitchFamily="34" charset="0"/>
+              </a:rPr>
+              <a:t>…</a:t>
+            </a:r>
+          </a:p>
+          <a:p>
+            <a:r>
+              <a:rPr kumimoji="1" lang="ja-JP" altLang="en-US" dirty="0">
+                <a:latin typeface="Arial" panose="020B0604020202020204" pitchFamily="34" charset="0"/>
+                <a:cs typeface="Arial" panose="020B0604020202020204" pitchFamily="34" charset="0"/>
+              </a:rPr>
+              <a:t>　・企業での採用事例に乏しい</a:t>
+            </a:r>
+            <a:r>
+              <a:rPr kumimoji="1" lang="en-US" altLang="ja-JP" dirty="0">
+                <a:latin typeface="Arial" panose="020B0604020202020204" pitchFamily="34" charset="0"/>
+                <a:cs typeface="Arial" panose="020B0604020202020204" pitchFamily="34" charset="0"/>
+              </a:rPr>
+              <a:t>…</a:t>
+            </a:r>
+          </a:p>
+          <a:p>
+            <a:r>
+              <a:rPr kumimoji="1" lang="ja-JP" altLang="en-US" dirty="0">
+                <a:latin typeface="Arial" panose="020B0604020202020204" pitchFamily="34" charset="0"/>
+                <a:cs typeface="Arial" panose="020B0604020202020204" pitchFamily="34" charset="0"/>
+              </a:rPr>
+              <a:t>　・</a:t>
+            </a:r>
+            <a:r>
+              <a:rPr kumimoji="1" lang="en-US" altLang="ja-JP" dirty="0">
+                <a:latin typeface="Arial" panose="020B0604020202020204" pitchFamily="34" charset="0"/>
+                <a:cs typeface="Arial" panose="020B0604020202020204" pitchFamily="34" charset="0"/>
+              </a:rPr>
+              <a:t>REST API</a:t>
+            </a:r>
+            <a:r>
+              <a:rPr kumimoji="1" lang="ja-JP" altLang="en-US" dirty="0">
+                <a:latin typeface="Arial" panose="020B0604020202020204" pitchFamily="34" charset="0"/>
+                <a:cs typeface="Arial" panose="020B0604020202020204" pitchFamily="34" charset="0"/>
+              </a:rPr>
+              <a:t>サーバ作成用で、</a:t>
+            </a:r>
+            <a:r>
+              <a:rPr kumimoji="1" lang="en-US" altLang="ja-JP" dirty="0">
+                <a:latin typeface="Arial" panose="020B0604020202020204" pitchFamily="34" charset="0"/>
+                <a:cs typeface="Arial" panose="020B0604020202020204" pitchFamily="34" charset="0"/>
+              </a:rPr>
+              <a:t>View</a:t>
+            </a:r>
+            <a:r>
+              <a:rPr kumimoji="1" lang="ja-JP" altLang="en-US" dirty="0">
+                <a:latin typeface="Arial" panose="020B0604020202020204" pitchFamily="34" charset="0"/>
+                <a:cs typeface="Arial" panose="020B0604020202020204" pitchFamily="34" charset="0"/>
+              </a:rPr>
+              <a:t>（</a:t>
+            </a:r>
+            <a:r>
+              <a:rPr kumimoji="1" lang="en-US" altLang="ja-JP" dirty="0">
+                <a:latin typeface="Arial" panose="020B0604020202020204" pitchFamily="34" charset="0"/>
+                <a:cs typeface="Arial" panose="020B0604020202020204" pitchFamily="34" charset="0"/>
+              </a:rPr>
+              <a:t>JSP</a:t>
+            </a:r>
+            <a:r>
+              <a:rPr kumimoji="1" lang="ja-JP" altLang="en-US" dirty="0">
+                <a:latin typeface="Arial" panose="020B0604020202020204" pitchFamily="34" charset="0"/>
+                <a:cs typeface="Arial" panose="020B0604020202020204" pitchFamily="34" charset="0"/>
+              </a:rPr>
+              <a:t>など）のサポートに乏しい</a:t>
+            </a:r>
             <a:endParaRPr kumimoji="1" lang="en-US" altLang="ja-JP" dirty="0">
               <a:latin typeface="Arial" panose="020B0604020202020204" pitchFamily="34" charset="0"/>
               <a:cs typeface="Arial" panose="020B0604020202020204" pitchFamily="34" charset="0"/>
             </a:endParaRPr>
           </a:p>
-          <a:p>
-            <a:r>
-              <a:rPr kumimoji="1" lang="ja-JP" altLang="en-US" dirty="0">
-                <a:latin typeface="Arial" panose="020B0604020202020204" pitchFamily="34" charset="0"/>
-                <a:cs typeface="Arial" panose="020B0604020202020204" pitchFamily="34" charset="0"/>
-              </a:rPr>
-              <a:t>　</a:t>
-            </a:r>
-            <a:r>
-              <a:rPr kumimoji="1" lang="ja-JP" altLang="en-US" u="sng" dirty="0">
-                <a:latin typeface="Arial" panose="020B0604020202020204" pitchFamily="34" charset="0"/>
-                <a:cs typeface="Arial" panose="020B0604020202020204" pitchFamily="34" charset="0"/>
-              </a:rPr>
-              <a:t>短所</a:t>
-            </a:r>
-            <a:endParaRPr kumimoji="1" lang="en-US" altLang="ja-JP" u="sng" dirty="0">
-              <a:latin typeface="Arial" panose="020B0604020202020204" pitchFamily="34" charset="0"/>
-              <a:cs typeface="Arial" panose="020B0604020202020204" pitchFamily="34" charset="0"/>
-            </a:endParaRPr>
-          </a:p>
-          <a:p>
-            <a:r>
-              <a:rPr kumimoji="1" lang="ja-JP" altLang="en-US" dirty="0">
-                <a:latin typeface="Arial" panose="020B0604020202020204" pitchFamily="34" charset="0"/>
-                <a:cs typeface="Arial" panose="020B0604020202020204" pitchFamily="34" charset="0"/>
-              </a:rPr>
-              <a:t>　・</a:t>
-            </a:r>
-            <a:r>
-              <a:rPr kumimoji="1" lang="en-US" altLang="ja-JP" dirty="0">
-                <a:latin typeface="Arial" panose="020B0604020202020204" pitchFamily="34" charset="0"/>
-                <a:cs typeface="Arial" panose="020B0604020202020204" pitchFamily="34" charset="0"/>
-              </a:rPr>
-              <a:t>Web</a:t>
-            </a:r>
-            <a:r>
-              <a:rPr kumimoji="1" lang="ja-JP" altLang="en-US" dirty="0">
-                <a:latin typeface="Arial" panose="020B0604020202020204" pitchFamily="34" charset="0"/>
-                <a:cs typeface="Arial" panose="020B0604020202020204" pitchFamily="34" charset="0"/>
-              </a:rPr>
-              <a:t>系フレームワークとして決定版となるものがない</a:t>
-            </a:r>
-            <a:r>
-              <a:rPr kumimoji="1" lang="en-US" altLang="ja-JP" dirty="0">
-                <a:latin typeface="Arial" panose="020B0604020202020204" pitchFamily="34" charset="0"/>
-                <a:cs typeface="Arial" panose="020B0604020202020204" pitchFamily="34" charset="0"/>
-              </a:rPr>
-              <a:t>…</a:t>
-            </a:r>
-          </a:p>
-          <a:p>
-            <a:r>
-              <a:rPr kumimoji="1" lang="ja-JP" altLang="en-US" dirty="0">
-                <a:latin typeface="Arial" panose="020B0604020202020204" pitchFamily="34" charset="0"/>
-                <a:cs typeface="Arial" panose="020B0604020202020204" pitchFamily="34" charset="0"/>
-              </a:rPr>
-              <a:t>　・</a:t>
-            </a:r>
-            <a:r>
-              <a:rPr kumimoji="1" lang="en-US" altLang="ja-JP" dirty="0">
-                <a:latin typeface="Arial" panose="020B0604020202020204" pitchFamily="34" charset="0"/>
-                <a:cs typeface="Arial" panose="020B0604020202020204" pitchFamily="34" charset="0"/>
-              </a:rPr>
-              <a:t>Web</a:t>
-            </a:r>
-            <a:r>
-              <a:rPr kumimoji="1" lang="ja-JP" altLang="en-US" dirty="0">
-                <a:latin typeface="Arial" panose="020B0604020202020204" pitchFamily="34" charset="0"/>
-                <a:cs typeface="Arial" panose="020B0604020202020204" pitchFamily="34" charset="0"/>
-              </a:rPr>
-              <a:t>や書籍などで得られる情報が少ない</a:t>
-            </a:r>
-            <a:r>
-              <a:rPr kumimoji="1" lang="en-US" altLang="ja-JP" dirty="0">
-                <a:latin typeface="Arial" panose="020B0604020202020204" pitchFamily="34" charset="0"/>
-                <a:cs typeface="Arial" panose="020B0604020202020204" pitchFamily="34" charset="0"/>
-              </a:rPr>
-              <a:t>…</a:t>
-            </a:r>
-          </a:p>
-          <a:p>
-            <a:r>
-              <a:rPr kumimoji="1" lang="ja-JP" altLang="en-US" dirty="0">
-                <a:latin typeface="Arial" panose="020B0604020202020204" pitchFamily="34" charset="0"/>
-                <a:cs typeface="Arial" panose="020B0604020202020204" pitchFamily="34" charset="0"/>
-              </a:rPr>
-              <a:t>　・企業での採用事例に乏しい</a:t>
-            </a:r>
-            <a:r>
-              <a:rPr kumimoji="1" lang="en-US" altLang="ja-JP" dirty="0">
-                <a:latin typeface="Arial" panose="020B0604020202020204" pitchFamily="34" charset="0"/>
-                <a:cs typeface="Arial" panose="020B0604020202020204" pitchFamily="34" charset="0"/>
-              </a:rPr>
-              <a:t>…</a:t>
-            </a:r>
-          </a:p>
-          <a:p>
-            <a:r>
-              <a:rPr kumimoji="1" lang="ja-JP" altLang="en-US" dirty="0">
-                <a:latin typeface="Arial" panose="020B0604020202020204" pitchFamily="34" charset="0"/>
-                <a:cs typeface="Arial" panose="020B0604020202020204" pitchFamily="34" charset="0"/>
-              </a:rPr>
-              <a:t>　・</a:t>
-            </a:r>
-            <a:r>
-              <a:rPr kumimoji="1" lang="en-US" altLang="ja-JP" dirty="0">
-                <a:latin typeface="Arial" panose="020B0604020202020204" pitchFamily="34" charset="0"/>
-                <a:cs typeface="Arial" panose="020B0604020202020204" pitchFamily="34" charset="0"/>
-              </a:rPr>
-              <a:t>REST API</a:t>
-            </a:r>
-            <a:r>
-              <a:rPr kumimoji="1" lang="ja-JP" altLang="en-US" dirty="0">
-                <a:latin typeface="Arial" panose="020B0604020202020204" pitchFamily="34" charset="0"/>
-                <a:cs typeface="Arial" panose="020B0604020202020204" pitchFamily="34" charset="0"/>
-              </a:rPr>
-              <a:t>サーバ作成用で、</a:t>
-            </a:r>
-            <a:r>
-              <a:rPr kumimoji="1" lang="en-US" altLang="ja-JP" dirty="0">
-                <a:latin typeface="Arial" panose="020B0604020202020204" pitchFamily="34" charset="0"/>
-                <a:cs typeface="Arial" panose="020B0604020202020204" pitchFamily="34" charset="0"/>
-              </a:rPr>
-              <a:t>View</a:t>
-            </a:r>
-            <a:r>
-              <a:rPr kumimoji="1" lang="ja-JP" altLang="en-US" dirty="0">
-                <a:latin typeface="Arial" panose="020B0604020202020204" pitchFamily="34" charset="0"/>
-                <a:cs typeface="Arial" panose="020B0604020202020204" pitchFamily="34" charset="0"/>
-              </a:rPr>
-              <a:t>（</a:t>
-            </a:r>
-            <a:r>
-              <a:rPr kumimoji="1" lang="en-US" altLang="ja-JP" dirty="0">
-                <a:latin typeface="Arial" panose="020B0604020202020204" pitchFamily="34" charset="0"/>
-                <a:cs typeface="Arial" panose="020B0604020202020204" pitchFamily="34" charset="0"/>
-              </a:rPr>
-              <a:t>JSP</a:t>
-            </a:r>
-            <a:r>
-              <a:rPr kumimoji="1" lang="ja-JP" altLang="en-US" dirty="0">
-                <a:latin typeface="Arial" panose="020B0604020202020204" pitchFamily="34" charset="0"/>
-                <a:cs typeface="Arial" panose="020B0604020202020204" pitchFamily="34" charset="0"/>
-              </a:rPr>
-              <a:t>など）のサポートに乏しい</a:t>
-            </a:r>
-            <a:endParaRPr kumimoji="1" lang="en-US" altLang="ja-JP" dirty="0">
-              <a:latin typeface="Arial" panose="020B0604020202020204" pitchFamily="34" charset="0"/>
-              <a:cs typeface="Arial" panose="020B0604020202020204" pitchFamily="34" charset="0"/>
-            </a:endParaRPr>
-          </a:p>
-        </p:txBody>
-      </p:sp>
-      <p:sp>
-        <p:nvSpPr>
-          <p:cNvPr id="9" name="四角形: 角を丸くする 8">
-            <a:extLst>
-              <a:ext uri="{FF2B5EF4-FFF2-40B4-BE49-F238E27FC236}">
-                <a16:creationId xmlns:a16="http://schemas.microsoft.com/office/drawing/2014/main" id="{695F8392-FE6A-47A1-A60B-62EF63E975E7}"/>
-              </a:ext>
-            </a:extLst>
-          </p:cNvPr>
-          <p:cNvSpPr/>
-          <p:nvPr/>
-        </p:nvSpPr>
-        <p:spPr>
-          <a:xfrm>
-            <a:off x="1030830" y="3079323"/>
-            <a:ext cx="7082340" cy="783770"/>
-          </a:xfrm>
-          <a:prstGeom prst="roundRect">
-            <a:avLst/>
-          </a:prstGeom>
-        </p:spPr>
-        <p:style>
-          <a:lnRef idx="3">
-            <a:schemeClr val="lt1"/>
-          </a:lnRef>
-          <a:fillRef idx="1">
-            <a:schemeClr val="accent2"/>
-          </a:fillRef>
-          <a:effectRef idx="1">
-            <a:schemeClr val="accent2"/>
-          </a:effectRef>
-          <a:fontRef idx="minor">
-            <a:schemeClr val="lt1"/>
-          </a:fontRef>
-        </p:style>
-        <p:txBody>
-          <a:bodyPr rtlCol="0" anchor="ctr"/>
-          <a:lstStyle/>
-          <a:p>
-            <a:pPr algn="ctr"/>
-            <a:endParaRPr kumimoji="1" lang="ja-JP" altLang="en-US"/>
-          </a:p>
-        </p:txBody>
-      </p:sp>
-      <p:sp>
-        <p:nvSpPr>
-          <p:cNvPr id="10" name="正方形/長方形 9">
-            <a:extLst>
-              <a:ext uri="{FF2B5EF4-FFF2-40B4-BE49-F238E27FC236}">
-                <a16:creationId xmlns:a16="http://schemas.microsoft.com/office/drawing/2014/main" id="{3A56752F-166A-4AED-8CD5-C9B661E8BFD1}"/>
-              </a:ext>
-            </a:extLst>
-          </p:cNvPr>
-          <p:cNvSpPr/>
-          <p:nvPr/>
-        </p:nvSpPr>
-        <p:spPr>
-          <a:xfrm>
-            <a:off x="1306213" y="3175592"/>
-            <a:ext cx="6647974" cy="646331"/>
-          </a:xfrm>
-          <a:prstGeom prst="rect">
-            <a:avLst/>
-          </a:prstGeom>
-        </p:spPr>
-        <p:txBody>
-          <a:bodyPr wrap="none">
-            <a:spAutoFit/>
-          </a:bodyPr>
-          <a:lstStyle/>
-          <a:p>
-            <a:r>
-              <a:rPr lang="ja-JP" altLang="en-US" b="1" dirty="0">
-                <a:solidFill>
-                  <a:schemeClr val="bg1"/>
-                </a:solidFill>
-                <a:latin typeface="Arial" panose="020B0604020202020204" pitchFamily="34" charset="0"/>
-                <a:cs typeface="Arial" panose="020B0604020202020204" pitchFamily="34" charset="0"/>
-              </a:rPr>
-              <a:t>処理上、ボトルネックになる部分で局所的に採用するのはアリ</a:t>
-            </a:r>
-            <a:endParaRPr lang="en-US" altLang="ja-JP" b="1" dirty="0">
-              <a:solidFill>
-                <a:schemeClr val="bg1"/>
-              </a:solidFill>
-              <a:latin typeface="Arial" panose="020B0604020202020204" pitchFamily="34" charset="0"/>
-              <a:cs typeface="Arial" panose="020B0604020202020204" pitchFamily="34" charset="0"/>
-            </a:endParaRPr>
-          </a:p>
-          <a:p>
-            <a:r>
-              <a:rPr lang="ja-JP" altLang="en-US" b="1" dirty="0">
-                <a:solidFill>
-                  <a:schemeClr val="bg1"/>
-                </a:solidFill>
-                <a:latin typeface="Arial" panose="020B0604020202020204" pitchFamily="34" charset="0"/>
-                <a:cs typeface="Arial" panose="020B0604020202020204" pitchFamily="34" charset="0"/>
-              </a:rPr>
-              <a:t>⇒ただし、汎用性があるかと聞かれると</a:t>
-            </a:r>
-            <a:r>
-              <a:rPr lang="en-US" altLang="ja-JP" b="1" dirty="0">
-                <a:solidFill>
-                  <a:schemeClr val="bg1"/>
-                </a:solidFill>
-                <a:latin typeface="Arial" panose="020B0604020202020204" pitchFamily="34" charset="0"/>
-                <a:cs typeface="Arial" panose="020B0604020202020204" pitchFamily="34" charset="0"/>
-              </a:rPr>
-              <a:t>…</a:t>
-            </a:r>
-            <a:r>
-              <a:rPr lang="ja-JP" altLang="en-US" b="1" dirty="0">
-                <a:solidFill>
-                  <a:schemeClr val="bg1"/>
-                </a:solidFill>
-                <a:latin typeface="Arial" panose="020B0604020202020204" pitchFamily="34" charset="0"/>
-                <a:cs typeface="Arial" panose="020B0604020202020204" pitchFamily="34" charset="0"/>
-              </a:rPr>
-              <a:t>？？</a:t>
-            </a:r>
-          </a:p>
         </p:txBody>
       </p:sp>
     </p:spTree>
     <p:extLst>
       <p:ext uri="{BB962C8B-B14F-4D97-AF65-F5344CB8AC3E}">
-        <p14:creationId xmlns:p14="http://schemas.microsoft.com/office/powerpoint/2010/main" val="2914239500"/>
+        <p14:creationId xmlns:p14="http://schemas.microsoft.com/office/powerpoint/2010/main" val="2932536701"/>
       </p:ext>
     </p:extLst>
   </p:cSld>
@@ -37464,10 +36986,10 @@
       </p:sp>
       <p:sp>
         <p:nvSpPr>
-          <p:cNvPr id="9" name="テキスト ボックス 8">
-            <a:extLst>
-              <a:ext uri="{FF2B5EF4-FFF2-40B4-BE49-F238E27FC236}">
-                <a16:creationId xmlns:a16="http://schemas.microsoft.com/office/drawing/2014/main" id="{CC218FFC-744C-4EEC-9300-47C4AB68BB86}"/>
+          <p:cNvPr id="6" name="テキスト ボックス 5">
+            <a:extLst>
+              <a:ext uri="{FF2B5EF4-FFF2-40B4-BE49-F238E27FC236}">
+                <a16:creationId xmlns:a16="http://schemas.microsoft.com/office/drawing/2014/main" id="{14123972-50C6-41A6-BC9E-54539A2FFD7C}"/>
               </a:ext>
             </a:extLst>
           </p:cNvPr>
@@ -37476,8 +36998,8 @@
         </p:nvSpPr>
         <p:spPr>
           <a:xfrm>
-            <a:off x="519673" y="944823"/>
-            <a:ext cx="8431224" cy="5170646"/>
+            <a:off x="630423" y="944823"/>
+            <a:ext cx="7252727" cy="1015663"/>
           </a:xfrm>
           <a:prstGeom prst="rect">
             <a:avLst/>
@@ -37495,7 +37017,7 @@
                 <a:latin typeface="Arial" panose="020B0604020202020204" pitchFamily="34" charset="0"/>
                 <a:cs typeface="Arial" panose="020B0604020202020204" pitchFamily="34" charset="0"/>
               </a:rPr>
-              <a:t>自分なりの答え</a:t>
+              <a:t>疑問</a:t>
             </a:r>
             <a:endParaRPr kumimoji="1" lang="en-US" altLang="ja-JP" sz="2000" b="1" u="sng" dirty="0">
               <a:latin typeface="Arial" panose="020B0604020202020204" pitchFamily="34" charset="0"/>
@@ -37504,18 +37026,96 @@
           </a:p>
           <a:p>
             <a:r>
+              <a:rPr kumimoji="1" lang="ja-JP" altLang="en-US" dirty="0">
+                <a:latin typeface="Arial" panose="020B0604020202020204" pitchFamily="34" charset="0"/>
+                <a:cs typeface="Arial" panose="020B0604020202020204" pitchFamily="34" charset="0"/>
+              </a:rPr>
+              <a:t>新規に</a:t>
+            </a:r>
+            <a:r>
+              <a:rPr kumimoji="1" lang="en-US" altLang="ja-JP" dirty="0">
+                <a:latin typeface="Arial" panose="020B0604020202020204" pitchFamily="34" charset="0"/>
+                <a:cs typeface="Arial" panose="020B0604020202020204" pitchFamily="34" charset="0"/>
+              </a:rPr>
+              <a:t>Web</a:t>
+            </a:r>
+            <a:r>
+              <a:rPr kumimoji="1" lang="ja-JP" altLang="en-US" dirty="0">
+                <a:latin typeface="Arial" panose="020B0604020202020204" pitchFamily="34" charset="0"/>
+                <a:cs typeface="Arial" panose="020B0604020202020204" pitchFamily="34" charset="0"/>
+              </a:rPr>
+              <a:t>アプリケーションを開発するとして、</a:t>
+            </a:r>
+            <a:endParaRPr kumimoji="1" lang="en-US" altLang="ja-JP" dirty="0">
+              <a:latin typeface="Arial" panose="020B0604020202020204" pitchFamily="34" charset="0"/>
+              <a:cs typeface="Arial" panose="020B0604020202020204" pitchFamily="34" charset="0"/>
+            </a:endParaRPr>
+          </a:p>
+          <a:p>
+            <a:r>
+              <a:rPr kumimoji="1" lang="ja-JP" altLang="en-US" dirty="0">
+                <a:latin typeface="Arial" panose="020B0604020202020204" pitchFamily="34" charset="0"/>
+                <a:cs typeface="Arial" panose="020B0604020202020204" pitchFamily="34" charset="0"/>
+              </a:rPr>
+              <a:t>バックエンドを開発する上で最良の言語は何か？</a:t>
+            </a:r>
+          </a:p>
+        </p:txBody>
+      </p:sp>
+      <p:sp>
+        <p:nvSpPr>
+          <p:cNvPr id="7" name="テキスト ボックス 6">
+            <a:extLst>
+              <a:ext uri="{FF2B5EF4-FFF2-40B4-BE49-F238E27FC236}">
+                <a16:creationId xmlns:a16="http://schemas.microsoft.com/office/drawing/2014/main" id="{D5B4DBB9-8190-4662-946D-489083AE3614}"/>
+              </a:ext>
+            </a:extLst>
+          </p:cNvPr>
+          <p:cNvSpPr txBox="1"/>
+          <p:nvPr/>
+        </p:nvSpPr>
+        <p:spPr>
+          <a:xfrm>
+            <a:off x="630422" y="2221764"/>
+            <a:ext cx="8104653" cy="4616648"/>
+          </a:xfrm>
+          <a:prstGeom prst="rect">
+            <a:avLst/>
+          </a:prstGeom>
+          <a:noFill/>
+        </p:spPr>
+        <p:txBody>
+          <a:bodyPr wrap="square" rtlCol="0">
+            <a:spAutoFit/>
+          </a:bodyPr>
+          <a:lstStyle/>
+          <a:p>
+            <a:r>
+              <a:rPr kumimoji="1" lang="ja-JP" altLang="en-US" sz="2400" b="1" u="sng" dirty="0">
+                <a:latin typeface="Arial" panose="020B0604020202020204" pitchFamily="34" charset="0"/>
+                <a:cs typeface="Arial" panose="020B0604020202020204" pitchFamily="34" charset="0"/>
+              </a:rPr>
+              <a:t>自分なりの答え</a:t>
+            </a:r>
+            <a:endParaRPr kumimoji="1" lang="en-US" altLang="ja-JP" sz="2000" b="1" u="sng" dirty="0">
+              <a:latin typeface="Arial" panose="020B0604020202020204" pitchFamily="34" charset="0"/>
+              <a:cs typeface="Arial" panose="020B0604020202020204" pitchFamily="34" charset="0"/>
+            </a:endParaRPr>
+          </a:p>
+          <a:p>
+            <a:r>
               <a:rPr kumimoji="1" lang="ja-JP" altLang="en-US" b="1" dirty="0">
                 <a:latin typeface="Arial" panose="020B0604020202020204" pitchFamily="34" charset="0"/>
                 <a:cs typeface="Arial" panose="020B0604020202020204" pitchFamily="34" charset="0"/>
               </a:rPr>
-              <a:t>（２）</a:t>
+              <a:t>（１）</a:t>
             </a:r>
             <a:r>
               <a:rPr kumimoji="1" lang="en-US" altLang="ja-JP" b="1" dirty="0">
                 <a:latin typeface="Arial" panose="020B0604020202020204" pitchFamily="34" charset="0"/>
                 <a:cs typeface="Arial" panose="020B0604020202020204" pitchFamily="34" charset="0"/>
               </a:rPr>
-              <a:t>Java</a:t>
+              <a:t>Go</a:t>
             </a:r>
             <a:r>
               <a:rPr kumimoji="1" lang="ja-JP" altLang="en-US" b="1" dirty="0">
@@ -37529,7 +37129,7 @@
                 <a:latin typeface="Arial" panose="020B0604020202020204" pitchFamily="34" charset="0"/>
                 <a:cs typeface="Arial" panose="020B0604020202020204" pitchFamily="34" charset="0"/>
               </a:rPr>
-              <a:t>Spring Framework</a:t>
+              <a:t>Golang</a:t>
             </a:r>
             <a:r>
               <a:rPr kumimoji="1" lang="ja-JP" altLang="en-US" b="1" dirty="0">
@@ -37583,14 +37183,14 @@
                 <a:latin typeface="Arial" panose="020B0604020202020204" pitchFamily="34" charset="0"/>
                 <a:cs typeface="Arial" panose="020B0604020202020204" pitchFamily="34" charset="0"/>
               </a:rPr>
-              <a:t>15</a:t>
+              <a:t>Google</a:t>
             </a:r>
             <a:r>
               <a:rPr kumimoji="1" lang="ja-JP" altLang="en-US" dirty="0">
                 <a:latin typeface="Arial" panose="020B0604020202020204" pitchFamily="34" charset="0"/>
                 <a:cs typeface="Arial" panose="020B0604020202020204" pitchFamily="34" charset="0"/>
               </a:rPr>
-              <a:t>年以上の歴史を持つ成熟したフレームワーク</a:t>
+              <a:t>発のプログラミング言語</a:t>
             </a:r>
             <a:endParaRPr kumimoji="1" lang="en-US" altLang="ja-JP" dirty="0">
               <a:latin typeface="Arial" panose="020B0604020202020204" pitchFamily="34" charset="0"/>
@@ -37603,49 +37203,7 @@
                 <a:latin typeface="Arial" panose="020B0604020202020204" pitchFamily="34" charset="0"/>
                 <a:cs typeface="Arial" panose="020B0604020202020204" pitchFamily="34" charset="0"/>
               </a:rPr>
-              <a:t>　⇒</a:t>
-            </a:r>
-            <a:r>
-              <a:rPr kumimoji="1" lang="en-US" altLang="ja-JP" dirty="0">
-                <a:latin typeface="Arial" panose="020B0604020202020204" pitchFamily="34" charset="0"/>
-                <a:cs typeface="Arial" panose="020B0604020202020204" pitchFamily="34" charset="0"/>
-              </a:rPr>
-              <a:t> Struts</a:t>
-            </a:r>
-            <a:r>
-              <a:rPr kumimoji="1" lang="ja-JP" altLang="en-US" dirty="0">
-                <a:latin typeface="Arial" panose="020B0604020202020204" pitchFamily="34" charset="0"/>
-                <a:cs typeface="Arial" panose="020B0604020202020204" pitchFamily="34" charset="0"/>
-              </a:rPr>
-              <a:t>や</a:t>
-            </a:r>
-            <a:r>
-              <a:rPr kumimoji="1" lang="en-US" altLang="ja-JP" dirty="0" err="1">
-                <a:latin typeface="Arial" panose="020B0604020202020204" pitchFamily="34" charset="0"/>
-                <a:cs typeface="Arial" panose="020B0604020202020204" pitchFamily="34" charset="0"/>
-              </a:rPr>
-              <a:t>Seasar</a:t>
-            </a:r>
-            <a:r>
-              <a:rPr kumimoji="1" lang="ja-JP" altLang="en-US" dirty="0">
-                <a:latin typeface="Arial" panose="020B0604020202020204" pitchFamily="34" charset="0"/>
-                <a:cs typeface="Arial" panose="020B0604020202020204" pitchFamily="34" charset="0"/>
-              </a:rPr>
-              <a:t>といった主要なフレームワークがすべて</a:t>
-            </a:r>
-            <a:r>
-              <a:rPr kumimoji="1" lang="en-US" altLang="ja-JP" dirty="0">
-                <a:latin typeface="Arial" panose="020B0604020202020204" pitchFamily="34" charset="0"/>
-                <a:cs typeface="Arial" panose="020B0604020202020204" pitchFamily="34" charset="0"/>
-              </a:rPr>
-              <a:t>EOL</a:t>
-            </a:r>
-            <a:r>
-              <a:rPr kumimoji="1" lang="ja-JP" altLang="en-US" dirty="0">
-                <a:latin typeface="Arial" panose="020B0604020202020204" pitchFamily="34" charset="0"/>
-                <a:cs typeface="Arial" panose="020B0604020202020204" pitchFamily="34" charset="0"/>
-              </a:rPr>
-              <a:t>となり、</a:t>
+              <a:t>　・文法に厳しく、複雑なコードを書かせない仕様（継承が使えないなど）</a:t>
             </a:r>
             <a:endParaRPr kumimoji="1" lang="en-US" altLang="ja-JP" dirty="0">
               <a:latin typeface="Arial" panose="020B0604020202020204" pitchFamily="34" charset="0"/>
@@ -37658,49 +37216,21 @@
                 <a:latin typeface="Arial" panose="020B0604020202020204" pitchFamily="34" charset="0"/>
                 <a:cs typeface="Arial" panose="020B0604020202020204" pitchFamily="34" charset="0"/>
               </a:rPr>
-              <a:t>　　</a:t>
+              <a:t>　・言語としてのパフォーマンスが高い（</a:t>
             </a:r>
             <a:r>
               <a:rPr kumimoji="1" lang="en-US" altLang="ja-JP" dirty="0">
                 <a:latin typeface="Arial" panose="020B0604020202020204" pitchFamily="34" charset="0"/>
                 <a:cs typeface="Arial" panose="020B0604020202020204" pitchFamily="34" charset="0"/>
               </a:rPr>
-              <a:t>Java</a:t>
+              <a:t>C</a:t>
             </a:r>
             <a:r>
               <a:rPr kumimoji="1" lang="ja-JP" altLang="en-US" dirty="0">
                 <a:latin typeface="Arial" panose="020B0604020202020204" pitchFamily="34" charset="0"/>
                 <a:cs typeface="Arial" panose="020B0604020202020204" pitchFamily="34" charset="0"/>
               </a:rPr>
-              <a:t>の</a:t>
-            </a:r>
-            <a:r>
-              <a:rPr kumimoji="1" lang="en-US" altLang="ja-JP" dirty="0">
-                <a:latin typeface="Arial" panose="020B0604020202020204" pitchFamily="34" charset="0"/>
-                <a:cs typeface="Arial" panose="020B0604020202020204" pitchFamily="34" charset="0"/>
-              </a:rPr>
-              <a:t>Web</a:t>
-            </a:r>
-            <a:r>
-              <a:rPr kumimoji="1" lang="ja-JP" altLang="en-US" dirty="0">
-                <a:latin typeface="Arial" panose="020B0604020202020204" pitchFamily="34" charset="0"/>
-                <a:cs typeface="Arial" panose="020B0604020202020204" pitchFamily="34" charset="0"/>
-              </a:rPr>
-              <a:t>系フレームワークは事実上</a:t>
-            </a:r>
-            <a:r>
-              <a:rPr kumimoji="1" lang="en-US" altLang="ja-JP" dirty="0">
-                <a:latin typeface="Arial" panose="020B0604020202020204" pitchFamily="34" charset="0"/>
-                <a:cs typeface="Arial" panose="020B0604020202020204" pitchFamily="34" charset="0"/>
-              </a:rPr>
-              <a:t>Spring</a:t>
-            </a:r>
-            <a:r>
-              <a:rPr kumimoji="1" lang="ja-JP" altLang="en-US" dirty="0">
-                <a:latin typeface="Arial" panose="020B0604020202020204" pitchFamily="34" charset="0"/>
-                <a:cs typeface="Arial" panose="020B0604020202020204" pitchFamily="34" charset="0"/>
-              </a:rPr>
-              <a:t>に一本化されつつある</a:t>
+              <a:t>言語に匹敵する速度）</a:t>
             </a:r>
             <a:endParaRPr kumimoji="1" lang="en-US" altLang="ja-JP" dirty="0">
               <a:latin typeface="Arial" panose="020B0604020202020204" pitchFamily="34" charset="0"/>
@@ -37708,6 +37238,13 @@
             </a:endParaRPr>
           </a:p>
           <a:p>
+            <a:r>
+              <a:rPr kumimoji="1" lang="ja-JP" altLang="en-US" dirty="0">
+                <a:latin typeface="Arial" panose="020B0604020202020204" pitchFamily="34" charset="0"/>
+                <a:cs typeface="Arial" panose="020B0604020202020204" pitchFamily="34" charset="0"/>
+              </a:rPr>
+              <a:t>　・並列処理が比較的簡単に書ける</a:t>
+            </a:r>
             <a:endParaRPr kumimoji="1" lang="en-US" altLang="ja-JP" dirty="0">
               <a:latin typeface="Arial" panose="020B0604020202020204" pitchFamily="34" charset="0"/>
               <a:cs typeface="Arial" panose="020B0604020202020204" pitchFamily="34" charset="0"/>
@@ -37719,35 +37256,21 @@
                 <a:latin typeface="Arial" panose="020B0604020202020204" pitchFamily="34" charset="0"/>
                 <a:cs typeface="Arial" panose="020B0604020202020204" pitchFamily="34" charset="0"/>
               </a:rPr>
-              <a:t>　・依存性の注入（</a:t>
+              <a:t>　・</a:t>
             </a:r>
             <a:r>
               <a:rPr kumimoji="1" lang="en-US" altLang="ja-JP" dirty="0">
                 <a:latin typeface="Arial" panose="020B0604020202020204" pitchFamily="34" charset="0"/>
                 <a:cs typeface="Arial" panose="020B0604020202020204" pitchFamily="34" charset="0"/>
               </a:rPr>
-              <a:t>DI</a:t>
+              <a:t>Web</a:t>
             </a:r>
             <a:r>
               <a:rPr kumimoji="1" lang="ja-JP" altLang="en-US" dirty="0">
                 <a:latin typeface="Arial" panose="020B0604020202020204" pitchFamily="34" charset="0"/>
                 <a:cs typeface="Arial" panose="020B0604020202020204" pitchFamily="34" charset="0"/>
               </a:rPr>
-              <a:t>）・アスペクト指向プログラミング（</a:t>
-            </a:r>
-            <a:r>
-              <a:rPr kumimoji="1" lang="en-US" altLang="ja-JP" dirty="0">
-                <a:latin typeface="Arial" panose="020B0604020202020204" pitchFamily="34" charset="0"/>
-                <a:cs typeface="Arial" panose="020B0604020202020204" pitchFamily="34" charset="0"/>
-              </a:rPr>
-              <a:t>AOP</a:t>
-            </a:r>
-            <a:r>
-              <a:rPr kumimoji="1" lang="ja-JP" altLang="en-US" dirty="0">
-                <a:latin typeface="Arial" panose="020B0604020202020204" pitchFamily="34" charset="0"/>
-                <a:cs typeface="Arial" panose="020B0604020202020204" pitchFamily="34" charset="0"/>
-              </a:rPr>
-              <a:t>）の仕組み　</a:t>
+              <a:t>アプリケーション開発に必要なライブラリを標準搭載</a:t>
             </a:r>
             <a:endParaRPr kumimoji="1" lang="en-US" altLang="ja-JP" dirty="0">
               <a:latin typeface="Arial" panose="020B0604020202020204" pitchFamily="34" charset="0"/>
@@ -37760,7 +37283,7 @@
                 <a:latin typeface="Arial" panose="020B0604020202020204" pitchFamily="34" charset="0"/>
                 <a:cs typeface="Arial" panose="020B0604020202020204" pitchFamily="34" charset="0"/>
               </a:rPr>
-              <a:t>　　を導入したモダンで一般的なフレームワーク（後述します）</a:t>
+              <a:t>　⇒ 言語レベルでのサポートが強力！</a:t>
             </a:r>
             <a:endParaRPr kumimoji="1" lang="en-US" altLang="ja-JP" dirty="0">
               <a:latin typeface="Arial" panose="020B0604020202020204" pitchFamily="34" charset="0"/>
@@ -37773,7 +37296,35 @@
                 <a:latin typeface="Arial" panose="020B0604020202020204" pitchFamily="34" charset="0"/>
                 <a:cs typeface="Arial" panose="020B0604020202020204" pitchFamily="34" charset="0"/>
               </a:rPr>
-              <a:t>　⇒モジュール間を疎結合化する仕組み（現代では常識に）</a:t>
+              <a:t>　⇒ユーザのアクセスが多い</a:t>
+            </a:r>
+            <a:r>
+              <a:rPr kumimoji="1" lang="en-US" altLang="ja-JP" dirty="0">
+                <a:latin typeface="Arial" panose="020B0604020202020204" pitchFamily="34" charset="0"/>
+                <a:cs typeface="Arial" panose="020B0604020202020204" pitchFamily="34" charset="0"/>
+              </a:rPr>
+              <a:t>EC</a:t>
+            </a:r>
+            <a:r>
+              <a:rPr kumimoji="1" lang="ja-JP" altLang="en-US" dirty="0">
+                <a:latin typeface="Arial" panose="020B0604020202020204" pitchFamily="34" charset="0"/>
+                <a:cs typeface="Arial" panose="020B0604020202020204" pitchFamily="34" charset="0"/>
+              </a:rPr>
+              <a:t>サイトを始めとする</a:t>
+            </a:r>
+            <a:r>
+              <a:rPr kumimoji="1" lang="en-US" altLang="ja-JP" dirty="0" err="1">
+                <a:latin typeface="Arial" panose="020B0604020202020204" pitchFamily="34" charset="0"/>
+                <a:cs typeface="Arial" panose="020B0604020202020204" pitchFamily="34" charset="0"/>
+              </a:rPr>
+              <a:t>BtoC</a:t>
+            </a:r>
+            <a:r>
+              <a:rPr kumimoji="1" lang="ja-JP" altLang="en-US" dirty="0">
+                <a:latin typeface="Arial" panose="020B0604020202020204" pitchFamily="34" charset="0"/>
+                <a:cs typeface="Arial" panose="020B0604020202020204" pitchFamily="34" charset="0"/>
+              </a:rPr>
+              <a:t>ビジネス向け</a:t>
             </a:r>
             <a:endParaRPr kumimoji="1" lang="en-US" altLang="ja-JP" dirty="0">
               <a:latin typeface="Arial" panose="020B0604020202020204" pitchFamily="34" charset="0"/>
@@ -37786,7 +37337,7 @@
                 <a:latin typeface="Arial" panose="020B0604020202020204" pitchFamily="34" charset="0"/>
                 <a:cs typeface="Arial" panose="020B0604020202020204" pitchFamily="34" charset="0"/>
               </a:rPr>
-              <a:t>　⇒テスト容易性、保守性、再利用性の高いコードを書く上で重要なコア技術</a:t>
+              <a:t>　</a:t>
             </a:r>
             <a:endParaRPr kumimoji="1" lang="en-US" altLang="ja-JP" dirty="0">
               <a:latin typeface="Arial" panose="020B0604020202020204" pitchFamily="34" charset="0"/>
@@ -37794,149 +37345,164 @@
             </a:endParaRPr>
           </a:p>
           <a:p>
+            <a:r>
+              <a:rPr kumimoji="1" lang="ja-JP" altLang="en-US" dirty="0">
+                <a:latin typeface="Arial" panose="020B0604020202020204" pitchFamily="34" charset="0"/>
+                <a:cs typeface="Arial" panose="020B0604020202020204" pitchFamily="34" charset="0"/>
+              </a:rPr>
+              <a:t>　</a:t>
+            </a:r>
+            <a:r>
+              <a:rPr kumimoji="1" lang="ja-JP" altLang="en-US" u="sng" dirty="0">
+                <a:latin typeface="Arial" panose="020B0604020202020204" pitchFamily="34" charset="0"/>
+                <a:cs typeface="Arial" panose="020B0604020202020204" pitchFamily="34" charset="0"/>
+              </a:rPr>
+              <a:t>短所</a:t>
+            </a:r>
+            <a:endParaRPr kumimoji="1" lang="en-US" altLang="ja-JP" u="sng" dirty="0">
+              <a:latin typeface="Arial" panose="020B0604020202020204" pitchFamily="34" charset="0"/>
+              <a:cs typeface="Arial" panose="020B0604020202020204" pitchFamily="34" charset="0"/>
+            </a:endParaRPr>
+          </a:p>
+          <a:p>
+            <a:r>
+              <a:rPr kumimoji="1" lang="ja-JP" altLang="en-US" dirty="0">
+                <a:latin typeface="Arial" panose="020B0604020202020204" pitchFamily="34" charset="0"/>
+                <a:cs typeface="Arial" panose="020B0604020202020204" pitchFamily="34" charset="0"/>
+              </a:rPr>
+              <a:t>　・</a:t>
+            </a:r>
+            <a:r>
+              <a:rPr kumimoji="1" lang="en-US" altLang="ja-JP" dirty="0">
+                <a:latin typeface="Arial" panose="020B0604020202020204" pitchFamily="34" charset="0"/>
+                <a:cs typeface="Arial" panose="020B0604020202020204" pitchFamily="34" charset="0"/>
+              </a:rPr>
+              <a:t>Web</a:t>
+            </a:r>
+            <a:r>
+              <a:rPr kumimoji="1" lang="ja-JP" altLang="en-US" dirty="0">
+                <a:latin typeface="Arial" panose="020B0604020202020204" pitchFamily="34" charset="0"/>
+                <a:cs typeface="Arial" panose="020B0604020202020204" pitchFamily="34" charset="0"/>
+              </a:rPr>
+              <a:t>系フレームワークとして決定版となるものがない</a:t>
+            </a:r>
+            <a:r>
+              <a:rPr kumimoji="1" lang="en-US" altLang="ja-JP" dirty="0">
+                <a:latin typeface="Arial" panose="020B0604020202020204" pitchFamily="34" charset="0"/>
+                <a:cs typeface="Arial" panose="020B0604020202020204" pitchFamily="34" charset="0"/>
+              </a:rPr>
+              <a:t>…</a:t>
+            </a:r>
+          </a:p>
+          <a:p>
+            <a:r>
+              <a:rPr kumimoji="1" lang="ja-JP" altLang="en-US" dirty="0">
+                <a:latin typeface="Arial" panose="020B0604020202020204" pitchFamily="34" charset="0"/>
+                <a:cs typeface="Arial" panose="020B0604020202020204" pitchFamily="34" charset="0"/>
+              </a:rPr>
+              <a:t>　・</a:t>
+            </a:r>
+            <a:r>
+              <a:rPr kumimoji="1" lang="en-US" altLang="ja-JP" dirty="0">
+                <a:latin typeface="Arial" panose="020B0604020202020204" pitchFamily="34" charset="0"/>
+                <a:cs typeface="Arial" panose="020B0604020202020204" pitchFamily="34" charset="0"/>
+              </a:rPr>
+              <a:t>Web</a:t>
+            </a:r>
+            <a:r>
+              <a:rPr kumimoji="1" lang="ja-JP" altLang="en-US" dirty="0">
+                <a:latin typeface="Arial" panose="020B0604020202020204" pitchFamily="34" charset="0"/>
+                <a:cs typeface="Arial" panose="020B0604020202020204" pitchFamily="34" charset="0"/>
+              </a:rPr>
+              <a:t>や書籍などで得られる情報が少ない</a:t>
+            </a:r>
+            <a:r>
+              <a:rPr kumimoji="1" lang="en-US" altLang="ja-JP" dirty="0">
+                <a:latin typeface="Arial" panose="020B0604020202020204" pitchFamily="34" charset="0"/>
+                <a:cs typeface="Arial" panose="020B0604020202020204" pitchFamily="34" charset="0"/>
+              </a:rPr>
+              <a:t>…</a:t>
+            </a:r>
+          </a:p>
+          <a:p>
+            <a:r>
+              <a:rPr kumimoji="1" lang="ja-JP" altLang="en-US" dirty="0">
+                <a:latin typeface="Arial" panose="020B0604020202020204" pitchFamily="34" charset="0"/>
+                <a:cs typeface="Arial" panose="020B0604020202020204" pitchFamily="34" charset="0"/>
+              </a:rPr>
+              <a:t>　・企業での採用事例に乏しい</a:t>
+            </a:r>
+            <a:r>
+              <a:rPr kumimoji="1" lang="en-US" altLang="ja-JP" dirty="0">
+                <a:latin typeface="Arial" panose="020B0604020202020204" pitchFamily="34" charset="0"/>
+                <a:cs typeface="Arial" panose="020B0604020202020204" pitchFamily="34" charset="0"/>
+              </a:rPr>
+              <a:t>…</a:t>
+            </a:r>
+          </a:p>
+          <a:p>
+            <a:r>
+              <a:rPr kumimoji="1" lang="ja-JP" altLang="en-US" dirty="0">
+                <a:latin typeface="Arial" panose="020B0604020202020204" pitchFamily="34" charset="0"/>
+                <a:cs typeface="Arial" panose="020B0604020202020204" pitchFamily="34" charset="0"/>
+              </a:rPr>
+              <a:t>　・</a:t>
+            </a:r>
+            <a:r>
+              <a:rPr kumimoji="1" lang="en-US" altLang="ja-JP" dirty="0">
+                <a:latin typeface="Arial" panose="020B0604020202020204" pitchFamily="34" charset="0"/>
+                <a:cs typeface="Arial" panose="020B0604020202020204" pitchFamily="34" charset="0"/>
+              </a:rPr>
+              <a:t>REST API</a:t>
+            </a:r>
+            <a:r>
+              <a:rPr kumimoji="1" lang="ja-JP" altLang="en-US" dirty="0">
+                <a:latin typeface="Arial" panose="020B0604020202020204" pitchFamily="34" charset="0"/>
+                <a:cs typeface="Arial" panose="020B0604020202020204" pitchFamily="34" charset="0"/>
+              </a:rPr>
+              <a:t>サーバ作成用で、</a:t>
+            </a:r>
+            <a:r>
+              <a:rPr kumimoji="1" lang="en-US" altLang="ja-JP" dirty="0">
+                <a:latin typeface="Arial" panose="020B0604020202020204" pitchFamily="34" charset="0"/>
+                <a:cs typeface="Arial" panose="020B0604020202020204" pitchFamily="34" charset="0"/>
+              </a:rPr>
+              <a:t>View</a:t>
+            </a:r>
+            <a:r>
+              <a:rPr kumimoji="1" lang="ja-JP" altLang="en-US" dirty="0">
+                <a:latin typeface="Arial" panose="020B0604020202020204" pitchFamily="34" charset="0"/>
+                <a:cs typeface="Arial" panose="020B0604020202020204" pitchFamily="34" charset="0"/>
+              </a:rPr>
+              <a:t>（</a:t>
+            </a:r>
+            <a:r>
+              <a:rPr kumimoji="1" lang="en-US" altLang="ja-JP" dirty="0">
+                <a:latin typeface="Arial" panose="020B0604020202020204" pitchFamily="34" charset="0"/>
+                <a:cs typeface="Arial" panose="020B0604020202020204" pitchFamily="34" charset="0"/>
+              </a:rPr>
+              <a:t>JSP</a:t>
+            </a:r>
+            <a:r>
+              <a:rPr kumimoji="1" lang="ja-JP" altLang="en-US" dirty="0">
+                <a:latin typeface="Arial" panose="020B0604020202020204" pitchFamily="34" charset="0"/>
+                <a:cs typeface="Arial" panose="020B0604020202020204" pitchFamily="34" charset="0"/>
+              </a:rPr>
+              <a:t>など）のサポートに乏しい</a:t>
+            </a:r>
             <a:endParaRPr kumimoji="1" lang="en-US" altLang="ja-JP" dirty="0">
               <a:latin typeface="Arial" panose="020B0604020202020204" pitchFamily="34" charset="0"/>
               <a:cs typeface="Arial" panose="020B0604020202020204" pitchFamily="34" charset="0"/>
             </a:endParaRPr>
           </a:p>
-          <a:p>
-            <a:r>
-              <a:rPr kumimoji="1" lang="ja-JP" altLang="en-US" dirty="0">
-                <a:latin typeface="Arial" panose="020B0604020202020204" pitchFamily="34" charset="0"/>
-                <a:cs typeface="Arial" panose="020B0604020202020204" pitchFamily="34" charset="0"/>
-              </a:rPr>
-              <a:t>　・オープンソースだが、</a:t>
-            </a:r>
-            <a:r>
-              <a:rPr kumimoji="1" lang="en-US" altLang="ja-JP" dirty="0">
-                <a:latin typeface="Arial" panose="020B0604020202020204" pitchFamily="34" charset="0"/>
-                <a:cs typeface="Arial" panose="020B0604020202020204" pitchFamily="34" charset="0"/>
-              </a:rPr>
-              <a:t>Pivotal</a:t>
-            </a:r>
-            <a:r>
-              <a:rPr kumimoji="1" lang="ja-JP" altLang="en-US" dirty="0">
-                <a:latin typeface="Arial" panose="020B0604020202020204" pitchFamily="34" charset="0"/>
-                <a:cs typeface="Arial" panose="020B0604020202020204" pitchFamily="34" charset="0"/>
-              </a:rPr>
-              <a:t>社（</a:t>
-            </a:r>
-            <a:r>
-              <a:rPr kumimoji="1" lang="en-US" altLang="ja-JP" dirty="0">
-                <a:latin typeface="Arial" panose="020B0604020202020204" pitchFamily="34" charset="0"/>
-                <a:cs typeface="Arial" panose="020B0604020202020204" pitchFamily="34" charset="0"/>
-              </a:rPr>
-              <a:t>Dell</a:t>
-            </a:r>
-            <a:r>
-              <a:rPr kumimoji="1" lang="ja-JP" altLang="en-US" dirty="0">
-                <a:latin typeface="Arial" panose="020B0604020202020204" pitchFamily="34" charset="0"/>
-                <a:cs typeface="Arial" panose="020B0604020202020204" pitchFamily="34" charset="0"/>
-              </a:rPr>
-              <a:t>の孫会社）がバックについている</a:t>
-            </a:r>
-            <a:endParaRPr kumimoji="1" lang="en-US" altLang="ja-JP" dirty="0">
-              <a:latin typeface="Arial" panose="020B0604020202020204" pitchFamily="34" charset="0"/>
-              <a:cs typeface="Arial" panose="020B0604020202020204" pitchFamily="34" charset="0"/>
-            </a:endParaRPr>
-          </a:p>
-          <a:p>
-            <a:r>
-              <a:rPr kumimoji="1" lang="ja-JP" altLang="en-US" dirty="0">
-                <a:latin typeface="Arial" panose="020B0604020202020204" pitchFamily="34" charset="0"/>
-                <a:cs typeface="Arial" panose="020B0604020202020204" pitchFamily="34" charset="0"/>
-              </a:rPr>
-              <a:t>　・エンタープライズ向けで、企業での採用事例が豊富</a:t>
-            </a:r>
-            <a:endParaRPr kumimoji="1" lang="en-US" altLang="ja-JP" dirty="0">
-              <a:latin typeface="Arial" panose="020B0604020202020204" pitchFamily="34" charset="0"/>
-              <a:cs typeface="Arial" panose="020B0604020202020204" pitchFamily="34" charset="0"/>
-            </a:endParaRPr>
-          </a:p>
-          <a:p>
-            <a:r>
-              <a:rPr kumimoji="1" lang="ja-JP" altLang="en-US" dirty="0">
-                <a:latin typeface="Arial" panose="020B0604020202020204" pitchFamily="34" charset="0"/>
-                <a:cs typeface="Arial" panose="020B0604020202020204" pitchFamily="34" charset="0"/>
-              </a:rPr>
-              <a:t>　・</a:t>
-            </a:r>
-            <a:r>
-              <a:rPr kumimoji="1" lang="en-US" altLang="ja-JP" dirty="0">
-                <a:latin typeface="Arial" panose="020B0604020202020204" pitchFamily="34" charset="0"/>
-                <a:cs typeface="Arial" panose="020B0604020202020204" pitchFamily="34" charset="0"/>
-              </a:rPr>
-              <a:t>Web</a:t>
-            </a:r>
-            <a:r>
-              <a:rPr kumimoji="1" lang="ja-JP" altLang="en-US" dirty="0">
-                <a:latin typeface="Arial" panose="020B0604020202020204" pitchFamily="34" charset="0"/>
-                <a:cs typeface="Arial" panose="020B0604020202020204" pitchFamily="34" charset="0"/>
-              </a:rPr>
-              <a:t>や書籍などで得られる情報も多い</a:t>
-            </a:r>
-            <a:endParaRPr kumimoji="1" lang="en-US" altLang="ja-JP" dirty="0">
-              <a:latin typeface="Arial" panose="020B0604020202020204" pitchFamily="34" charset="0"/>
-              <a:cs typeface="Arial" panose="020B0604020202020204" pitchFamily="34" charset="0"/>
-            </a:endParaRPr>
-          </a:p>
-          <a:p>
-            <a:r>
-              <a:rPr kumimoji="1" lang="ja-JP" altLang="en-US" dirty="0">
-                <a:latin typeface="Arial" panose="020B0604020202020204" pitchFamily="34" charset="0"/>
-                <a:cs typeface="Arial" panose="020B0604020202020204" pitchFamily="34" charset="0"/>
-              </a:rPr>
-              <a:t>　</a:t>
-            </a:r>
-            <a:endParaRPr kumimoji="1" lang="en-US" altLang="ja-JP" dirty="0">
-              <a:latin typeface="Arial" panose="020B0604020202020204" pitchFamily="34" charset="0"/>
-              <a:cs typeface="Arial" panose="020B0604020202020204" pitchFamily="34" charset="0"/>
-            </a:endParaRPr>
-          </a:p>
-          <a:p>
-            <a:r>
-              <a:rPr kumimoji="1" lang="ja-JP" altLang="en-US" dirty="0">
-                <a:latin typeface="Arial" panose="020B0604020202020204" pitchFamily="34" charset="0"/>
-                <a:cs typeface="Arial" panose="020B0604020202020204" pitchFamily="34" charset="0"/>
-              </a:rPr>
-              <a:t>　</a:t>
-            </a:r>
-            <a:r>
-              <a:rPr kumimoji="1" lang="ja-JP" altLang="en-US" u="sng" dirty="0">
-                <a:latin typeface="Arial" panose="020B0604020202020204" pitchFamily="34" charset="0"/>
-                <a:cs typeface="Arial" panose="020B0604020202020204" pitchFamily="34" charset="0"/>
-              </a:rPr>
-              <a:t>短所</a:t>
-            </a:r>
-            <a:endParaRPr kumimoji="1" lang="en-US" altLang="ja-JP" u="sng" dirty="0">
-              <a:latin typeface="Arial" panose="020B0604020202020204" pitchFamily="34" charset="0"/>
-              <a:cs typeface="Arial" panose="020B0604020202020204" pitchFamily="34" charset="0"/>
-            </a:endParaRPr>
-          </a:p>
-          <a:p>
-            <a:r>
-              <a:rPr kumimoji="1" lang="ja-JP" altLang="en-US" dirty="0">
-                <a:latin typeface="Arial" panose="020B0604020202020204" pitchFamily="34" charset="0"/>
-                <a:cs typeface="Arial" panose="020B0604020202020204" pitchFamily="34" charset="0"/>
-              </a:rPr>
-              <a:t>　・学習コストがかなり高い</a:t>
-            </a:r>
-            <a:r>
-              <a:rPr kumimoji="1" lang="en-US" altLang="ja-JP" dirty="0">
-                <a:latin typeface="Arial" panose="020B0604020202020204" pitchFamily="34" charset="0"/>
-                <a:cs typeface="Arial" panose="020B0604020202020204" pitchFamily="34" charset="0"/>
-              </a:rPr>
-              <a:t>…</a:t>
-            </a:r>
-          </a:p>
-        </p:txBody>
-      </p:sp>
-      <p:sp>
-        <p:nvSpPr>
-          <p:cNvPr id="2" name="四角形: 角を丸くする 1">
-            <a:extLst>
-              <a:ext uri="{FF2B5EF4-FFF2-40B4-BE49-F238E27FC236}">
-                <a16:creationId xmlns:a16="http://schemas.microsoft.com/office/drawing/2014/main" id="{3B3CE963-A3DB-4A94-B517-71289B5E1E37}"/>
+        </p:txBody>
+      </p:sp>
+      <p:sp>
+        <p:nvSpPr>
+          <p:cNvPr id="9" name="四角形: 角を丸くする 8">
+            <a:extLst>
+              <a:ext uri="{FF2B5EF4-FFF2-40B4-BE49-F238E27FC236}">
+                <a16:creationId xmlns:a16="http://schemas.microsoft.com/office/drawing/2014/main" id="{695F8392-FE6A-47A1-A60B-62EF63E975E7}"/>
               </a:ext>
             </a:extLst>
           </p:cNvPr>
@@ -37945,8 +37511,8 @@
         </p:nvSpPr>
         <p:spPr>
           <a:xfrm>
-            <a:off x="954630" y="6115469"/>
-            <a:ext cx="7446420" cy="505464"/>
+            <a:off x="1030830" y="3079323"/>
+            <a:ext cx="7082340" cy="783770"/>
           </a:xfrm>
           <a:prstGeom prst="roundRect">
             <a:avLst/>
@@ -37977,10 +37543,10 @@
       </p:sp>
       <p:sp>
         <p:nvSpPr>
-          <p:cNvPr id="3" name="正方形/長方形 2">
-            <a:extLst>
-              <a:ext uri="{FF2B5EF4-FFF2-40B4-BE49-F238E27FC236}">
-                <a16:creationId xmlns:a16="http://schemas.microsoft.com/office/drawing/2014/main" id="{E8BA1019-655D-4E88-84B4-B1413AA1A053}"/>
+          <p:cNvPr id="10" name="正方形/長方形 9">
+            <a:extLst>
+              <a:ext uri="{FF2B5EF4-FFF2-40B4-BE49-F238E27FC236}">
+                <a16:creationId xmlns:a16="http://schemas.microsoft.com/office/drawing/2014/main" id="{3A56752F-166A-4AED-8CD5-C9B661E8BFD1}"/>
               </a:ext>
             </a:extLst>
           </p:cNvPr>
@@ -37989,8 +37555,8 @@
         </p:nvSpPr>
         <p:spPr>
           <a:xfrm>
-            <a:off x="1208941" y="6189089"/>
-            <a:ext cx="5925661" cy="369332"/>
+            <a:off x="1306213" y="3175592"/>
+            <a:ext cx="6647974" cy="646331"/>
           </a:xfrm>
           <a:prstGeom prst="rect">
             <a:avLst/>
@@ -38003,6 +37569,35 @@
           <a:lstStyle/>
           <a:p>
             <a:r>
+              <a:rPr lang="ja-JP" altLang="en-US" b="1" dirty="0">
+                <a:solidFill>
+                  <a:schemeClr val="bg1"/>
+                </a:solidFill>
+                <a:latin typeface="Arial" panose="020B0604020202020204" pitchFamily="34" charset="0"/>
+                <a:cs typeface="Arial" panose="020B0604020202020204" pitchFamily="34" charset="0"/>
+              </a:rPr>
+              <a:t>処理上、ボトルネックになる部分で局所的に採用するのはアリ</a:t>
+            </a:r>
+            <a:endParaRPr lang="en-US" altLang="ja-JP" b="1" dirty="0">
+              <a:solidFill>
+                <a:schemeClr val="bg1"/>
+              </a:solidFill>
+              <a:latin typeface="Arial" panose="020B0604020202020204" pitchFamily="34" charset="0"/>
+              <a:cs typeface="Arial" panose="020B0604020202020204" pitchFamily="34" charset="0"/>
+            </a:endParaRPr>
+          </a:p>
+          <a:p>
+            <a:r>
+              <a:rPr lang="ja-JP" altLang="en-US" b="1" dirty="0">
+                <a:solidFill>
+                  <a:schemeClr val="bg1"/>
+                </a:solidFill>
+                <a:latin typeface="Arial" panose="020B0604020202020204" pitchFamily="34" charset="0"/>
+                <a:cs typeface="Arial" panose="020B0604020202020204" pitchFamily="34" charset="0"/>
+              </a:rPr>
+              <a:t>⇒ただし、汎用性があるかと聞かれると</a:t>
+            </a:r>
+            <a:r>
               <a:rPr lang="en-US" altLang="ja-JP" b="1" dirty="0">
                 <a:solidFill>
                   <a:schemeClr val="bg1"/>
@@ -38010,37 +37605,17 @@
                 <a:latin typeface="Arial" panose="020B0604020202020204" pitchFamily="34" charset="0"/>
                 <a:cs typeface="Arial" panose="020B0604020202020204" pitchFamily="34" charset="0"/>
               </a:rPr>
-              <a:t>Spring Framework</a:t>
-            </a:r>
-            <a:r>
-              <a:rPr lang="ja-JP" altLang="en-US" b="1" dirty="0" err="1">
+              <a:t>…</a:t>
+            </a:r>
+            <a:r>
+              <a:rPr lang="ja-JP" altLang="en-US" b="1" dirty="0">
                 <a:solidFill>
                   <a:schemeClr val="bg1"/>
                 </a:solidFill>
                 <a:latin typeface="Arial" panose="020B0604020202020204" pitchFamily="34" charset="0"/>
                 <a:cs typeface="Arial" panose="020B0604020202020204" pitchFamily="34" charset="0"/>
               </a:rPr>
-              <a:t>での</a:t>
-            </a:r>
-            <a:r>
-              <a:rPr lang="en-US" altLang="ja-JP" b="1" dirty="0">
-                <a:solidFill>
-                  <a:schemeClr val="bg1"/>
-                </a:solidFill>
-                <a:latin typeface="Arial" panose="020B0604020202020204" pitchFamily="34" charset="0"/>
-                <a:cs typeface="Arial" panose="020B0604020202020204" pitchFamily="34" charset="0"/>
-              </a:rPr>
-              <a:t>Web</a:t>
-            </a:r>
-            <a:r>
-              <a:rPr lang="ja-JP" altLang="en-US" b="1" dirty="0">
-                <a:solidFill>
-                  <a:schemeClr val="bg1"/>
-                </a:solidFill>
-                <a:latin typeface="Arial" panose="020B0604020202020204" pitchFamily="34" charset="0"/>
-                <a:cs typeface="Arial" panose="020B0604020202020204" pitchFamily="34" charset="0"/>
-              </a:rPr>
-              <a:t>開発が有力という結論に。</a:t>
+              <a:t>？？</a:t>
             </a:r>
           </a:p>
         </p:txBody>
@@ -38048,7 +37623,7 @@
     </p:spTree>
     <p:extLst>
       <p:ext uri="{BB962C8B-B14F-4D97-AF65-F5344CB8AC3E}">
-        <p14:creationId xmlns:p14="http://schemas.microsoft.com/office/powerpoint/2010/main" val="388935514"/>
+        <p14:creationId xmlns:p14="http://schemas.microsoft.com/office/powerpoint/2010/main" val="2914239500"/>
       </p:ext>
     </p:extLst>
   </p:cSld>
@@ -38674,8 +38249,8 @@
         </p:nvSpPr>
         <p:spPr>
           <a:xfrm>
-            <a:off x="789530" y="3194050"/>
-            <a:ext cx="7446420" cy="1320800"/>
+            <a:off x="954630" y="6115469"/>
+            <a:ext cx="7446420" cy="505464"/>
           </a:xfrm>
           <a:prstGeom prst="roundRect">
             <a:avLst/>
@@ -38718,6 +38293,735 @@
         </p:nvSpPr>
         <p:spPr>
           <a:xfrm>
+            <a:off x="1208941" y="6189089"/>
+            <a:ext cx="5925661" cy="369332"/>
+          </a:xfrm>
+          <a:prstGeom prst="rect">
+            <a:avLst/>
+          </a:prstGeom>
+        </p:spPr>
+        <p:txBody>
+          <a:bodyPr wrap="none">
+            <a:spAutoFit/>
+          </a:bodyPr>
+          <a:lstStyle/>
+          <a:p>
+            <a:r>
+              <a:rPr lang="en-US" altLang="ja-JP" b="1" dirty="0">
+                <a:solidFill>
+                  <a:schemeClr val="bg1"/>
+                </a:solidFill>
+                <a:latin typeface="Arial" panose="020B0604020202020204" pitchFamily="34" charset="0"/>
+                <a:cs typeface="Arial" panose="020B0604020202020204" pitchFamily="34" charset="0"/>
+              </a:rPr>
+              <a:t>Spring Framework</a:t>
+            </a:r>
+            <a:r>
+              <a:rPr lang="ja-JP" altLang="en-US" b="1" dirty="0" err="1">
+                <a:solidFill>
+                  <a:schemeClr val="bg1"/>
+                </a:solidFill>
+                <a:latin typeface="Arial" panose="020B0604020202020204" pitchFamily="34" charset="0"/>
+                <a:cs typeface="Arial" panose="020B0604020202020204" pitchFamily="34" charset="0"/>
+              </a:rPr>
+              <a:t>での</a:t>
+            </a:r>
+            <a:r>
+              <a:rPr lang="en-US" altLang="ja-JP" b="1" dirty="0">
+                <a:solidFill>
+                  <a:schemeClr val="bg1"/>
+                </a:solidFill>
+                <a:latin typeface="Arial" panose="020B0604020202020204" pitchFamily="34" charset="0"/>
+                <a:cs typeface="Arial" panose="020B0604020202020204" pitchFamily="34" charset="0"/>
+              </a:rPr>
+              <a:t>Web</a:t>
+            </a:r>
+            <a:r>
+              <a:rPr lang="ja-JP" altLang="en-US" b="1" dirty="0">
+                <a:solidFill>
+                  <a:schemeClr val="bg1"/>
+                </a:solidFill>
+                <a:latin typeface="Arial" panose="020B0604020202020204" pitchFamily="34" charset="0"/>
+                <a:cs typeface="Arial" panose="020B0604020202020204" pitchFamily="34" charset="0"/>
+              </a:rPr>
+              <a:t>開発が有力という結論に。</a:t>
+            </a:r>
+          </a:p>
+        </p:txBody>
+      </p:sp>
+    </p:spTree>
+    <p:extLst>
+      <p:ext uri="{BB962C8B-B14F-4D97-AF65-F5344CB8AC3E}">
+        <p14:creationId xmlns:p14="http://schemas.microsoft.com/office/powerpoint/2010/main" val="388935514"/>
+      </p:ext>
+    </p:extLst>
+  </p:cSld>
+  <p:clrMapOvr>
+    <a:masterClrMapping/>
+  </p:clrMapOvr>
+</p:sld>
+</file>
+
+<file path=ppt/slides/slide44.xml><?xml version="1.0" encoding="utf-8"?>
+<p:sld xmlns:a="http://schemas.openxmlformats.org/drawingml/2006/main" xmlns:r="http://schemas.openxmlformats.org/officeDocument/2006/relationships" xmlns:p="http://schemas.openxmlformats.org/presentationml/2006/main">
+  <p:cSld>
+    <p:spTree>
+      <p:nvGrpSpPr>
+        <p:cNvPr id="1" name=""/>
+        <p:cNvGrpSpPr/>
+        <p:nvPr/>
+      </p:nvGrpSpPr>
+      <p:grpSpPr>
+        <a:xfrm>
+          <a:off x="0" y="0"/>
+          <a:ext cx="0" cy="0"/>
+          <a:chOff x="0" y="0"/>
+          <a:chExt cx="0" cy="0"/>
+        </a:xfrm>
+      </p:grpSpPr>
+      <p:sp>
+        <p:nvSpPr>
+          <p:cNvPr id="4" name="正方形/長方形 3">
+            <a:extLst>
+              <a:ext uri="{FF2B5EF4-FFF2-40B4-BE49-F238E27FC236}">
+                <a16:creationId xmlns:a16="http://schemas.microsoft.com/office/drawing/2014/main" id="{32C6647E-0174-48E7-9743-EC8850846EBD}"/>
+              </a:ext>
+            </a:extLst>
+          </p:cNvPr>
+          <p:cNvSpPr/>
+          <p:nvPr/>
+        </p:nvSpPr>
+        <p:spPr>
+          <a:xfrm>
+            <a:off x="0" y="0"/>
+            <a:ext cx="9144000" cy="783771"/>
+          </a:xfrm>
+          <a:prstGeom prst="rect">
+            <a:avLst/>
+          </a:prstGeom>
+          <a:solidFill>
+            <a:schemeClr val="tx1">
+              <a:lumMod val="85000"/>
+              <a:lumOff val="15000"/>
+            </a:schemeClr>
+          </a:solidFill>
+          <a:ln>
+            <a:noFill/>
+          </a:ln>
+        </p:spPr>
+        <p:style>
+          <a:lnRef idx="2">
+            <a:schemeClr val="accent1">
+              <a:shade val="50000"/>
+            </a:schemeClr>
+          </a:lnRef>
+          <a:fillRef idx="1">
+            <a:schemeClr val="accent1"/>
+          </a:fillRef>
+          <a:effectRef idx="0">
+            <a:schemeClr val="accent1"/>
+          </a:effectRef>
+          <a:fontRef idx="minor">
+            <a:schemeClr val="lt1"/>
+          </a:fontRef>
+        </p:style>
+        <p:txBody>
+          <a:bodyPr rtlCol="0" anchor="ctr"/>
+          <a:lstStyle/>
+          <a:p>
+            <a:pPr algn="ctr"/>
+            <a:endParaRPr kumimoji="1" lang="ja-JP" altLang="en-US"/>
+          </a:p>
+        </p:txBody>
+      </p:sp>
+      <p:sp>
+        <p:nvSpPr>
+          <p:cNvPr id="5" name="テキスト ボックス 4">
+            <a:extLst>
+              <a:ext uri="{FF2B5EF4-FFF2-40B4-BE49-F238E27FC236}">
+                <a16:creationId xmlns:a16="http://schemas.microsoft.com/office/drawing/2014/main" id="{05244AEF-A024-4C1F-A085-BDA432EF9126}"/>
+              </a:ext>
+            </a:extLst>
+          </p:cNvPr>
+          <p:cNvSpPr txBox="1"/>
+          <p:nvPr/>
+        </p:nvSpPr>
+        <p:spPr>
+          <a:xfrm>
+            <a:off x="408924" y="161052"/>
+            <a:ext cx="4918450" cy="461665"/>
+          </a:xfrm>
+          <a:prstGeom prst="rect">
+            <a:avLst/>
+          </a:prstGeom>
+          <a:noFill/>
+        </p:spPr>
+        <p:txBody>
+          <a:bodyPr wrap="square" rtlCol="0">
+            <a:spAutoFit/>
+          </a:bodyPr>
+          <a:lstStyle/>
+          <a:p>
+            <a:r>
+              <a:rPr kumimoji="1" lang="ja-JP" altLang="en-US" sz="2400" b="1" dirty="0">
+                <a:solidFill>
+                  <a:schemeClr val="bg1"/>
+                </a:solidFill>
+                <a:latin typeface="Arial" panose="020B0604020202020204" pitchFamily="34" charset="0"/>
+                <a:cs typeface="Arial" panose="020B0604020202020204" pitchFamily="34" charset="0"/>
+              </a:rPr>
+              <a:t>なぜ</a:t>
+            </a:r>
+            <a:r>
+              <a:rPr kumimoji="1" lang="en-US" altLang="ja-JP" sz="2400" b="1" dirty="0">
+                <a:solidFill>
+                  <a:schemeClr val="bg1"/>
+                </a:solidFill>
+                <a:latin typeface="Arial" panose="020B0604020202020204" pitchFamily="34" charset="0"/>
+                <a:cs typeface="Arial" panose="020B0604020202020204" pitchFamily="34" charset="0"/>
+              </a:rPr>
+              <a:t>Spring framework</a:t>
+            </a:r>
+            <a:r>
+              <a:rPr kumimoji="1" lang="ja-JP" altLang="en-US" sz="2400" b="1" dirty="0">
+                <a:solidFill>
+                  <a:schemeClr val="bg1"/>
+                </a:solidFill>
+                <a:latin typeface="Arial" panose="020B0604020202020204" pitchFamily="34" charset="0"/>
+                <a:cs typeface="Arial" panose="020B0604020202020204" pitchFamily="34" charset="0"/>
+              </a:rPr>
+              <a:t>なのか</a:t>
+            </a:r>
+          </a:p>
+        </p:txBody>
+      </p:sp>
+      <p:sp>
+        <p:nvSpPr>
+          <p:cNvPr id="9" name="テキスト ボックス 8">
+            <a:extLst>
+              <a:ext uri="{FF2B5EF4-FFF2-40B4-BE49-F238E27FC236}">
+                <a16:creationId xmlns:a16="http://schemas.microsoft.com/office/drawing/2014/main" id="{CC218FFC-744C-4EEC-9300-47C4AB68BB86}"/>
+              </a:ext>
+            </a:extLst>
+          </p:cNvPr>
+          <p:cNvSpPr txBox="1"/>
+          <p:nvPr/>
+        </p:nvSpPr>
+        <p:spPr>
+          <a:xfrm>
+            <a:off x="519673" y="944823"/>
+            <a:ext cx="8431224" cy="5170646"/>
+          </a:xfrm>
+          <a:prstGeom prst="rect">
+            <a:avLst/>
+          </a:prstGeom>
+          <a:noFill/>
+        </p:spPr>
+        <p:txBody>
+          <a:bodyPr wrap="square" rtlCol="0">
+            <a:spAutoFit/>
+          </a:bodyPr>
+          <a:lstStyle/>
+          <a:p>
+            <a:r>
+              <a:rPr kumimoji="1" lang="ja-JP" altLang="en-US" sz="2400" b="1" u="sng" dirty="0">
+                <a:latin typeface="Arial" panose="020B0604020202020204" pitchFamily="34" charset="0"/>
+                <a:cs typeface="Arial" panose="020B0604020202020204" pitchFamily="34" charset="0"/>
+              </a:rPr>
+              <a:t>自分なりの答え</a:t>
+            </a:r>
+            <a:endParaRPr kumimoji="1" lang="en-US" altLang="ja-JP" sz="2000" b="1" u="sng" dirty="0">
+              <a:latin typeface="Arial" panose="020B0604020202020204" pitchFamily="34" charset="0"/>
+              <a:cs typeface="Arial" panose="020B0604020202020204" pitchFamily="34" charset="0"/>
+            </a:endParaRPr>
+          </a:p>
+          <a:p>
+            <a:r>
+              <a:rPr kumimoji="1" lang="ja-JP" altLang="en-US" b="1" dirty="0">
+                <a:latin typeface="Arial" panose="020B0604020202020204" pitchFamily="34" charset="0"/>
+                <a:cs typeface="Arial" panose="020B0604020202020204" pitchFamily="34" charset="0"/>
+              </a:rPr>
+              <a:t>（２）</a:t>
+            </a:r>
+            <a:r>
+              <a:rPr kumimoji="1" lang="en-US" altLang="ja-JP" b="1" dirty="0">
+                <a:latin typeface="Arial" panose="020B0604020202020204" pitchFamily="34" charset="0"/>
+                <a:cs typeface="Arial" panose="020B0604020202020204" pitchFamily="34" charset="0"/>
+              </a:rPr>
+              <a:t>Java</a:t>
+            </a:r>
+            <a:r>
+              <a:rPr kumimoji="1" lang="ja-JP" altLang="en-US" b="1" dirty="0">
+                <a:latin typeface="Arial" panose="020B0604020202020204" pitchFamily="34" charset="0"/>
+                <a:cs typeface="Arial" panose="020B0604020202020204" pitchFamily="34" charset="0"/>
+              </a:rPr>
+              <a:t>言語（</a:t>
+            </a:r>
+            <a:r>
+              <a:rPr kumimoji="1" lang="en-US" altLang="ja-JP" b="1" dirty="0">
+                <a:latin typeface="Arial" panose="020B0604020202020204" pitchFamily="34" charset="0"/>
+                <a:cs typeface="Arial" panose="020B0604020202020204" pitchFamily="34" charset="0"/>
+              </a:rPr>
+              <a:t>Spring Framework</a:t>
+            </a:r>
+            <a:r>
+              <a:rPr kumimoji="1" lang="ja-JP" altLang="en-US" b="1" dirty="0">
+                <a:latin typeface="Arial" panose="020B0604020202020204" pitchFamily="34" charset="0"/>
+                <a:cs typeface="Arial" panose="020B0604020202020204" pitchFamily="34" charset="0"/>
+              </a:rPr>
+              <a:t>）</a:t>
+            </a:r>
+            <a:endParaRPr kumimoji="1" lang="en-US" altLang="ja-JP" b="1" dirty="0">
+              <a:latin typeface="Arial" panose="020B0604020202020204" pitchFamily="34" charset="0"/>
+              <a:cs typeface="Arial" panose="020B0604020202020204" pitchFamily="34" charset="0"/>
+            </a:endParaRPr>
+          </a:p>
+          <a:p>
+            <a:r>
+              <a:rPr kumimoji="1" lang="ja-JP" altLang="en-US" dirty="0">
+                <a:latin typeface="Arial" panose="020B0604020202020204" pitchFamily="34" charset="0"/>
+                <a:cs typeface="Arial" panose="020B0604020202020204" pitchFamily="34" charset="0"/>
+              </a:rPr>
+              <a:t>　</a:t>
+            </a:r>
+            <a:r>
+              <a:rPr kumimoji="1" lang="ja-JP" altLang="en-US" u="sng" dirty="0">
+                <a:latin typeface="Arial" panose="020B0604020202020204" pitchFamily="34" charset="0"/>
+                <a:cs typeface="Arial" panose="020B0604020202020204" pitchFamily="34" charset="0"/>
+              </a:rPr>
+              <a:t>長所</a:t>
+            </a:r>
+            <a:r>
+              <a:rPr kumimoji="1" lang="ja-JP" altLang="en-US" dirty="0">
+                <a:latin typeface="Arial" panose="020B0604020202020204" pitchFamily="34" charset="0"/>
+                <a:cs typeface="Arial" panose="020B0604020202020204" pitchFamily="34" charset="0"/>
+              </a:rPr>
+              <a:t>　</a:t>
+            </a:r>
+            <a:endParaRPr kumimoji="1" lang="en-US" altLang="ja-JP" dirty="0">
+              <a:latin typeface="Arial" panose="020B0604020202020204" pitchFamily="34" charset="0"/>
+              <a:cs typeface="Arial" panose="020B0604020202020204" pitchFamily="34" charset="0"/>
+            </a:endParaRPr>
+          </a:p>
+          <a:p>
+            <a:r>
+              <a:rPr kumimoji="1" lang="ja-JP" altLang="en-US" dirty="0">
+                <a:latin typeface="Arial" panose="020B0604020202020204" pitchFamily="34" charset="0"/>
+                <a:cs typeface="Arial" panose="020B0604020202020204" pitchFamily="34" charset="0"/>
+              </a:rPr>
+              <a:t>　・</a:t>
+            </a:r>
+            <a:r>
+              <a:rPr kumimoji="1" lang="en-US" altLang="ja-JP" dirty="0">
+                <a:latin typeface="Arial" panose="020B0604020202020204" pitchFamily="34" charset="0"/>
+                <a:cs typeface="Arial" panose="020B0604020202020204" pitchFamily="34" charset="0"/>
+              </a:rPr>
+              <a:t>15</a:t>
+            </a:r>
+            <a:r>
+              <a:rPr kumimoji="1" lang="ja-JP" altLang="en-US" dirty="0">
+                <a:latin typeface="Arial" panose="020B0604020202020204" pitchFamily="34" charset="0"/>
+                <a:cs typeface="Arial" panose="020B0604020202020204" pitchFamily="34" charset="0"/>
+              </a:rPr>
+              <a:t>年以上の歴史を持つ成熟したフレームワーク</a:t>
+            </a:r>
+            <a:endParaRPr kumimoji="1" lang="en-US" altLang="ja-JP" dirty="0">
+              <a:latin typeface="Arial" panose="020B0604020202020204" pitchFamily="34" charset="0"/>
+              <a:cs typeface="Arial" panose="020B0604020202020204" pitchFamily="34" charset="0"/>
+            </a:endParaRPr>
+          </a:p>
+          <a:p>
+            <a:r>
+              <a:rPr kumimoji="1" lang="ja-JP" altLang="en-US" dirty="0">
+                <a:latin typeface="Arial" panose="020B0604020202020204" pitchFamily="34" charset="0"/>
+                <a:cs typeface="Arial" panose="020B0604020202020204" pitchFamily="34" charset="0"/>
+              </a:rPr>
+              <a:t>　⇒</a:t>
+            </a:r>
+            <a:r>
+              <a:rPr kumimoji="1" lang="en-US" altLang="ja-JP" dirty="0">
+                <a:latin typeface="Arial" panose="020B0604020202020204" pitchFamily="34" charset="0"/>
+                <a:cs typeface="Arial" panose="020B0604020202020204" pitchFamily="34" charset="0"/>
+              </a:rPr>
+              <a:t> Struts</a:t>
+            </a:r>
+            <a:r>
+              <a:rPr kumimoji="1" lang="ja-JP" altLang="en-US" dirty="0">
+                <a:latin typeface="Arial" panose="020B0604020202020204" pitchFamily="34" charset="0"/>
+                <a:cs typeface="Arial" panose="020B0604020202020204" pitchFamily="34" charset="0"/>
+              </a:rPr>
+              <a:t>や</a:t>
+            </a:r>
+            <a:r>
+              <a:rPr kumimoji="1" lang="en-US" altLang="ja-JP" dirty="0" err="1">
+                <a:latin typeface="Arial" panose="020B0604020202020204" pitchFamily="34" charset="0"/>
+                <a:cs typeface="Arial" panose="020B0604020202020204" pitchFamily="34" charset="0"/>
+              </a:rPr>
+              <a:t>Seasar</a:t>
+            </a:r>
+            <a:r>
+              <a:rPr kumimoji="1" lang="ja-JP" altLang="en-US" dirty="0">
+                <a:latin typeface="Arial" panose="020B0604020202020204" pitchFamily="34" charset="0"/>
+                <a:cs typeface="Arial" panose="020B0604020202020204" pitchFamily="34" charset="0"/>
+              </a:rPr>
+              <a:t>といった主要なフレームワークがすべて</a:t>
+            </a:r>
+            <a:r>
+              <a:rPr kumimoji="1" lang="en-US" altLang="ja-JP" dirty="0">
+                <a:latin typeface="Arial" panose="020B0604020202020204" pitchFamily="34" charset="0"/>
+                <a:cs typeface="Arial" panose="020B0604020202020204" pitchFamily="34" charset="0"/>
+              </a:rPr>
+              <a:t>EOL</a:t>
+            </a:r>
+            <a:r>
+              <a:rPr kumimoji="1" lang="ja-JP" altLang="en-US" dirty="0">
+                <a:latin typeface="Arial" panose="020B0604020202020204" pitchFamily="34" charset="0"/>
+                <a:cs typeface="Arial" panose="020B0604020202020204" pitchFamily="34" charset="0"/>
+              </a:rPr>
+              <a:t>となり、</a:t>
+            </a:r>
+            <a:endParaRPr kumimoji="1" lang="en-US" altLang="ja-JP" dirty="0">
+              <a:latin typeface="Arial" panose="020B0604020202020204" pitchFamily="34" charset="0"/>
+              <a:cs typeface="Arial" panose="020B0604020202020204" pitchFamily="34" charset="0"/>
+            </a:endParaRPr>
+          </a:p>
+          <a:p>
+            <a:r>
+              <a:rPr kumimoji="1" lang="ja-JP" altLang="en-US" dirty="0">
+                <a:latin typeface="Arial" panose="020B0604020202020204" pitchFamily="34" charset="0"/>
+                <a:cs typeface="Arial" panose="020B0604020202020204" pitchFamily="34" charset="0"/>
+              </a:rPr>
+              <a:t>　　</a:t>
+            </a:r>
+            <a:r>
+              <a:rPr kumimoji="1" lang="en-US" altLang="ja-JP" dirty="0">
+                <a:latin typeface="Arial" panose="020B0604020202020204" pitchFamily="34" charset="0"/>
+                <a:cs typeface="Arial" panose="020B0604020202020204" pitchFamily="34" charset="0"/>
+              </a:rPr>
+              <a:t>Java</a:t>
+            </a:r>
+            <a:r>
+              <a:rPr kumimoji="1" lang="ja-JP" altLang="en-US" dirty="0">
+                <a:latin typeface="Arial" panose="020B0604020202020204" pitchFamily="34" charset="0"/>
+                <a:cs typeface="Arial" panose="020B0604020202020204" pitchFamily="34" charset="0"/>
+              </a:rPr>
+              <a:t>の</a:t>
+            </a:r>
+            <a:r>
+              <a:rPr kumimoji="1" lang="en-US" altLang="ja-JP" dirty="0">
+                <a:latin typeface="Arial" panose="020B0604020202020204" pitchFamily="34" charset="0"/>
+                <a:cs typeface="Arial" panose="020B0604020202020204" pitchFamily="34" charset="0"/>
+              </a:rPr>
+              <a:t>Web</a:t>
+            </a:r>
+            <a:r>
+              <a:rPr kumimoji="1" lang="ja-JP" altLang="en-US" dirty="0">
+                <a:latin typeface="Arial" panose="020B0604020202020204" pitchFamily="34" charset="0"/>
+                <a:cs typeface="Arial" panose="020B0604020202020204" pitchFamily="34" charset="0"/>
+              </a:rPr>
+              <a:t>系フレームワークは事実上</a:t>
+            </a:r>
+            <a:r>
+              <a:rPr kumimoji="1" lang="en-US" altLang="ja-JP" dirty="0">
+                <a:latin typeface="Arial" panose="020B0604020202020204" pitchFamily="34" charset="0"/>
+                <a:cs typeface="Arial" panose="020B0604020202020204" pitchFamily="34" charset="0"/>
+              </a:rPr>
+              <a:t>Spring</a:t>
+            </a:r>
+            <a:r>
+              <a:rPr kumimoji="1" lang="ja-JP" altLang="en-US" dirty="0">
+                <a:latin typeface="Arial" panose="020B0604020202020204" pitchFamily="34" charset="0"/>
+                <a:cs typeface="Arial" panose="020B0604020202020204" pitchFamily="34" charset="0"/>
+              </a:rPr>
+              <a:t>に一本化されつつある</a:t>
+            </a:r>
+            <a:endParaRPr kumimoji="1" lang="en-US" altLang="ja-JP" dirty="0">
+              <a:latin typeface="Arial" panose="020B0604020202020204" pitchFamily="34" charset="0"/>
+              <a:cs typeface="Arial" panose="020B0604020202020204" pitchFamily="34" charset="0"/>
+            </a:endParaRPr>
+          </a:p>
+          <a:p>
+            <a:endParaRPr kumimoji="1" lang="en-US" altLang="ja-JP" dirty="0">
+              <a:latin typeface="Arial" panose="020B0604020202020204" pitchFamily="34" charset="0"/>
+              <a:cs typeface="Arial" panose="020B0604020202020204" pitchFamily="34" charset="0"/>
+            </a:endParaRPr>
+          </a:p>
+          <a:p>
+            <a:r>
+              <a:rPr kumimoji="1" lang="ja-JP" altLang="en-US" dirty="0">
+                <a:latin typeface="Arial" panose="020B0604020202020204" pitchFamily="34" charset="0"/>
+                <a:cs typeface="Arial" panose="020B0604020202020204" pitchFamily="34" charset="0"/>
+              </a:rPr>
+              <a:t>　・依存性の注入（</a:t>
+            </a:r>
+            <a:r>
+              <a:rPr kumimoji="1" lang="en-US" altLang="ja-JP" dirty="0">
+                <a:latin typeface="Arial" panose="020B0604020202020204" pitchFamily="34" charset="0"/>
+                <a:cs typeface="Arial" panose="020B0604020202020204" pitchFamily="34" charset="0"/>
+              </a:rPr>
+              <a:t>DI</a:t>
+            </a:r>
+            <a:r>
+              <a:rPr kumimoji="1" lang="ja-JP" altLang="en-US" dirty="0">
+                <a:latin typeface="Arial" panose="020B0604020202020204" pitchFamily="34" charset="0"/>
+                <a:cs typeface="Arial" panose="020B0604020202020204" pitchFamily="34" charset="0"/>
+              </a:rPr>
+              <a:t>）・アスペクト指向プログラミング（</a:t>
+            </a:r>
+            <a:r>
+              <a:rPr kumimoji="1" lang="en-US" altLang="ja-JP" dirty="0">
+                <a:latin typeface="Arial" panose="020B0604020202020204" pitchFamily="34" charset="0"/>
+                <a:cs typeface="Arial" panose="020B0604020202020204" pitchFamily="34" charset="0"/>
+              </a:rPr>
+              <a:t>AOP</a:t>
+            </a:r>
+            <a:r>
+              <a:rPr kumimoji="1" lang="ja-JP" altLang="en-US" dirty="0">
+                <a:latin typeface="Arial" panose="020B0604020202020204" pitchFamily="34" charset="0"/>
+                <a:cs typeface="Arial" panose="020B0604020202020204" pitchFamily="34" charset="0"/>
+              </a:rPr>
+              <a:t>）の仕組み　</a:t>
+            </a:r>
+            <a:endParaRPr kumimoji="1" lang="en-US" altLang="ja-JP" dirty="0">
+              <a:latin typeface="Arial" panose="020B0604020202020204" pitchFamily="34" charset="0"/>
+              <a:cs typeface="Arial" panose="020B0604020202020204" pitchFamily="34" charset="0"/>
+            </a:endParaRPr>
+          </a:p>
+          <a:p>
+            <a:r>
+              <a:rPr kumimoji="1" lang="ja-JP" altLang="en-US" dirty="0">
+                <a:latin typeface="Arial" panose="020B0604020202020204" pitchFamily="34" charset="0"/>
+                <a:cs typeface="Arial" panose="020B0604020202020204" pitchFamily="34" charset="0"/>
+              </a:rPr>
+              <a:t>　　を導入したモダンで一般的なフレームワーク（後述します）</a:t>
+            </a:r>
+            <a:endParaRPr kumimoji="1" lang="en-US" altLang="ja-JP" dirty="0">
+              <a:latin typeface="Arial" panose="020B0604020202020204" pitchFamily="34" charset="0"/>
+              <a:cs typeface="Arial" panose="020B0604020202020204" pitchFamily="34" charset="0"/>
+            </a:endParaRPr>
+          </a:p>
+          <a:p>
+            <a:r>
+              <a:rPr kumimoji="1" lang="ja-JP" altLang="en-US" dirty="0">
+                <a:latin typeface="Arial" panose="020B0604020202020204" pitchFamily="34" charset="0"/>
+                <a:cs typeface="Arial" panose="020B0604020202020204" pitchFamily="34" charset="0"/>
+              </a:rPr>
+              <a:t>　⇒モジュール間を疎結合化する仕組み（現代では常識に）</a:t>
+            </a:r>
+            <a:endParaRPr kumimoji="1" lang="en-US" altLang="ja-JP" dirty="0">
+              <a:latin typeface="Arial" panose="020B0604020202020204" pitchFamily="34" charset="0"/>
+              <a:cs typeface="Arial" panose="020B0604020202020204" pitchFamily="34" charset="0"/>
+            </a:endParaRPr>
+          </a:p>
+          <a:p>
+            <a:r>
+              <a:rPr kumimoji="1" lang="ja-JP" altLang="en-US" dirty="0">
+                <a:latin typeface="Arial" panose="020B0604020202020204" pitchFamily="34" charset="0"/>
+                <a:cs typeface="Arial" panose="020B0604020202020204" pitchFamily="34" charset="0"/>
+              </a:rPr>
+              <a:t>　⇒テスト容易性、保守性、再利用性の高いコードを書く上で重要なコア技術</a:t>
+            </a:r>
+            <a:endParaRPr kumimoji="1" lang="en-US" altLang="ja-JP" dirty="0">
+              <a:latin typeface="Arial" panose="020B0604020202020204" pitchFamily="34" charset="0"/>
+              <a:cs typeface="Arial" panose="020B0604020202020204" pitchFamily="34" charset="0"/>
+            </a:endParaRPr>
+          </a:p>
+          <a:p>
+            <a:endParaRPr kumimoji="1" lang="en-US" altLang="ja-JP" dirty="0">
+              <a:latin typeface="Arial" panose="020B0604020202020204" pitchFamily="34" charset="0"/>
+              <a:cs typeface="Arial" panose="020B0604020202020204" pitchFamily="34" charset="0"/>
+            </a:endParaRPr>
+          </a:p>
+          <a:p>
+            <a:r>
+              <a:rPr kumimoji="1" lang="ja-JP" altLang="en-US" dirty="0">
+                <a:latin typeface="Arial" panose="020B0604020202020204" pitchFamily="34" charset="0"/>
+                <a:cs typeface="Arial" panose="020B0604020202020204" pitchFamily="34" charset="0"/>
+              </a:rPr>
+              <a:t>　・オープンソースだが、</a:t>
+            </a:r>
+            <a:r>
+              <a:rPr kumimoji="1" lang="en-US" altLang="ja-JP" dirty="0">
+                <a:latin typeface="Arial" panose="020B0604020202020204" pitchFamily="34" charset="0"/>
+                <a:cs typeface="Arial" panose="020B0604020202020204" pitchFamily="34" charset="0"/>
+              </a:rPr>
+              <a:t>Pivotal</a:t>
+            </a:r>
+            <a:r>
+              <a:rPr kumimoji="1" lang="ja-JP" altLang="en-US" dirty="0">
+                <a:latin typeface="Arial" panose="020B0604020202020204" pitchFamily="34" charset="0"/>
+                <a:cs typeface="Arial" panose="020B0604020202020204" pitchFamily="34" charset="0"/>
+              </a:rPr>
+              <a:t>社（</a:t>
+            </a:r>
+            <a:r>
+              <a:rPr kumimoji="1" lang="en-US" altLang="ja-JP" dirty="0">
+                <a:latin typeface="Arial" panose="020B0604020202020204" pitchFamily="34" charset="0"/>
+                <a:cs typeface="Arial" panose="020B0604020202020204" pitchFamily="34" charset="0"/>
+              </a:rPr>
+              <a:t>Dell</a:t>
+            </a:r>
+            <a:r>
+              <a:rPr kumimoji="1" lang="ja-JP" altLang="en-US" dirty="0">
+                <a:latin typeface="Arial" panose="020B0604020202020204" pitchFamily="34" charset="0"/>
+                <a:cs typeface="Arial" panose="020B0604020202020204" pitchFamily="34" charset="0"/>
+              </a:rPr>
+              <a:t>の孫会社）がバックについている</a:t>
+            </a:r>
+            <a:endParaRPr kumimoji="1" lang="en-US" altLang="ja-JP" dirty="0">
+              <a:latin typeface="Arial" panose="020B0604020202020204" pitchFamily="34" charset="0"/>
+              <a:cs typeface="Arial" panose="020B0604020202020204" pitchFamily="34" charset="0"/>
+            </a:endParaRPr>
+          </a:p>
+          <a:p>
+            <a:r>
+              <a:rPr kumimoji="1" lang="ja-JP" altLang="en-US" dirty="0">
+                <a:latin typeface="Arial" panose="020B0604020202020204" pitchFamily="34" charset="0"/>
+                <a:cs typeface="Arial" panose="020B0604020202020204" pitchFamily="34" charset="0"/>
+              </a:rPr>
+              <a:t>　・エンタープライズ向けで、企業での採用事例が豊富</a:t>
+            </a:r>
+            <a:endParaRPr kumimoji="1" lang="en-US" altLang="ja-JP" dirty="0">
+              <a:latin typeface="Arial" panose="020B0604020202020204" pitchFamily="34" charset="0"/>
+              <a:cs typeface="Arial" panose="020B0604020202020204" pitchFamily="34" charset="0"/>
+            </a:endParaRPr>
+          </a:p>
+          <a:p>
+            <a:r>
+              <a:rPr kumimoji="1" lang="ja-JP" altLang="en-US" dirty="0">
+                <a:latin typeface="Arial" panose="020B0604020202020204" pitchFamily="34" charset="0"/>
+                <a:cs typeface="Arial" panose="020B0604020202020204" pitchFamily="34" charset="0"/>
+              </a:rPr>
+              <a:t>　・</a:t>
+            </a:r>
+            <a:r>
+              <a:rPr kumimoji="1" lang="en-US" altLang="ja-JP" dirty="0">
+                <a:latin typeface="Arial" panose="020B0604020202020204" pitchFamily="34" charset="0"/>
+                <a:cs typeface="Arial" panose="020B0604020202020204" pitchFamily="34" charset="0"/>
+              </a:rPr>
+              <a:t>Web</a:t>
+            </a:r>
+            <a:r>
+              <a:rPr kumimoji="1" lang="ja-JP" altLang="en-US" dirty="0">
+                <a:latin typeface="Arial" panose="020B0604020202020204" pitchFamily="34" charset="0"/>
+                <a:cs typeface="Arial" panose="020B0604020202020204" pitchFamily="34" charset="0"/>
+              </a:rPr>
+              <a:t>や書籍などで得られる情報も多い</a:t>
+            </a:r>
+            <a:endParaRPr kumimoji="1" lang="en-US" altLang="ja-JP" dirty="0">
+              <a:latin typeface="Arial" panose="020B0604020202020204" pitchFamily="34" charset="0"/>
+              <a:cs typeface="Arial" panose="020B0604020202020204" pitchFamily="34" charset="0"/>
+            </a:endParaRPr>
+          </a:p>
+          <a:p>
+            <a:r>
+              <a:rPr kumimoji="1" lang="ja-JP" altLang="en-US" dirty="0">
+                <a:latin typeface="Arial" panose="020B0604020202020204" pitchFamily="34" charset="0"/>
+                <a:cs typeface="Arial" panose="020B0604020202020204" pitchFamily="34" charset="0"/>
+              </a:rPr>
+              <a:t>　</a:t>
+            </a:r>
+            <a:endParaRPr kumimoji="1" lang="en-US" altLang="ja-JP" dirty="0">
+              <a:latin typeface="Arial" panose="020B0604020202020204" pitchFamily="34" charset="0"/>
+              <a:cs typeface="Arial" panose="020B0604020202020204" pitchFamily="34" charset="0"/>
+            </a:endParaRPr>
+          </a:p>
+          <a:p>
+            <a:r>
+              <a:rPr kumimoji="1" lang="ja-JP" altLang="en-US" dirty="0">
+                <a:latin typeface="Arial" panose="020B0604020202020204" pitchFamily="34" charset="0"/>
+                <a:cs typeface="Arial" panose="020B0604020202020204" pitchFamily="34" charset="0"/>
+              </a:rPr>
+              <a:t>　</a:t>
+            </a:r>
+            <a:r>
+              <a:rPr kumimoji="1" lang="ja-JP" altLang="en-US" u="sng" dirty="0">
+                <a:latin typeface="Arial" panose="020B0604020202020204" pitchFamily="34" charset="0"/>
+                <a:cs typeface="Arial" panose="020B0604020202020204" pitchFamily="34" charset="0"/>
+              </a:rPr>
+              <a:t>短所</a:t>
+            </a:r>
+            <a:endParaRPr kumimoji="1" lang="en-US" altLang="ja-JP" u="sng" dirty="0">
+              <a:latin typeface="Arial" panose="020B0604020202020204" pitchFamily="34" charset="0"/>
+              <a:cs typeface="Arial" panose="020B0604020202020204" pitchFamily="34" charset="0"/>
+            </a:endParaRPr>
+          </a:p>
+          <a:p>
+            <a:r>
+              <a:rPr kumimoji="1" lang="ja-JP" altLang="en-US" dirty="0">
+                <a:latin typeface="Arial" panose="020B0604020202020204" pitchFamily="34" charset="0"/>
+                <a:cs typeface="Arial" panose="020B0604020202020204" pitchFamily="34" charset="0"/>
+              </a:rPr>
+              <a:t>　・学習コストがかなり高い</a:t>
+            </a:r>
+            <a:r>
+              <a:rPr kumimoji="1" lang="en-US" altLang="ja-JP" dirty="0">
+                <a:latin typeface="Arial" panose="020B0604020202020204" pitchFamily="34" charset="0"/>
+                <a:cs typeface="Arial" panose="020B0604020202020204" pitchFamily="34" charset="0"/>
+              </a:rPr>
+              <a:t>…</a:t>
+            </a:r>
+          </a:p>
+        </p:txBody>
+      </p:sp>
+      <p:sp>
+        <p:nvSpPr>
+          <p:cNvPr id="2" name="四角形: 角を丸くする 1">
+            <a:extLst>
+              <a:ext uri="{FF2B5EF4-FFF2-40B4-BE49-F238E27FC236}">
+                <a16:creationId xmlns:a16="http://schemas.microsoft.com/office/drawing/2014/main" id="{3B3CE963-A3DB-4A94-B517-71289B5E1E37}"/>
+              </a:ext>
+            </a:extLst>
+          </p:cNvPr>
+          <p:cNvSpPr/>
+          <p:nvPr/>
+        </p:nvSpPr>
+        <p:spPr>
+          <a:xfrm>
+            <a:off x="789530" y="3194050"/>
+            <a:ext cx="7446420" cy="1320800"/>
+          </a:xfrm>
+          <a:prstGeom prst="roundRect">
+            <a:avLst/>
+          </a:prstGeom>
+        </p:spPr>
+        <p:style>
+          <a:lnRef idx="3">
+            <a:schemeClr val="lt1"/>
+          </a:lnRef>
+          <a:fillRef idx="1">
+            <a:schemeClr val="accent2"/>
+          </a:fillRef>
+          <a:effectRef idx="1">
+            <a:schemeClr val="accent2"/>
+          </a:effectRef>
+          <a:fontRef idx="minor">
+            <a:schemeClr val="lt1"/>
+          </a:fontRef>
+        </p:style>
+        <p:txBody>
+          <a:bodyPr rtlCol="0" anchor="ctr"/>
+          <a:lstStyle/>
+          <a:p>
+            <a:pPr algn="ctr"/>
+            <a:endParaRPr kumimoji="1" lang="ja-JP" altLang="en-US"/>
+          </a:p>
+        </p:txBody>
+      </p:sp>
+      <p:sp>
+        <p:nvSpPr>
+          <p:cNvPr id="3" name="正方形/長方形 2">
+            <a:extLst>
+              <a:ext uri="{FF2B5EF4-FFF2-40B4-BE49-F238E27FC236}">
+                <a16:creationId xmlns:a16="http://schemas.microsoft.com/office/drawing/2014/main" id="{E8BA1019-655D-4E88-84B4-B1413AA1A053}"/>
+              </a:ext>
+            </a:extLst>
+          </p:cNvPr>
+          <p:cNvSpPr/>
+          <p:nvPr/>
+        </p:nvSpPr>
+        <p:spPr>
+          <a:xfrm>
             <a:off x="1043841" y="3267670"/>
             <a:ext cx="7340471" cy="1200329"/>
           </a:xfrm>
@@ -38874,7 +39178,7 @@
 </p:sld>
 </file>
 
-<file path=ppt/slides/slide44.xml><?xml version="1.0" encoding="utf-8"?>
+<file path=ppt/slides/slide45.xml><?xml version="1.0" encoding="utf-8"?>
 <p:sld xmlns:a="http://schemas.openxmlformats.org/drawingml/2006/main" xmlns:r="http://schemas.openxmlformats.org/officeDocument/2006/relationships" xmlns:p="http://schemas.openxmlformats.org/presentationml/2006/main">
   <p:cSld>
     <p:spTree>

</xml_diff>